<commit_message>
3 slides in presintation and small changes in text
</commit_message>
<xml_diff>
--- a/RescueRobotsForNN.pptx
+++ b/RescueRobotsForNN.pptx
@@ -10,8 +10,8 @@
   <p:sldIdLst>
     <p:sldId id="648" r:id="rId2"/>
     <p:sldId id="655" r:id="rId3"/>
-    <p:sldId id="661" r:id="rId4"/>
-    <p:sldId id="660" r:id="rId5"/>
+    <p:sldId id="660" r:id="rId4"/>
+    <p:sldId id="661" r:id="rId5"/>
     <p:sldId id="651" r:id="rId6"/>
     <p:sldId id="662" r:id="rId7"/>
     <p:sldId id="663" r:id="rId8"/>
@@ -1163,7 +1163,7 @@
               <a:pPr>
                 <a:defRPr/>
               </a:pPr>
-              <a:t>22.03.2015</a:t>
+              <a:t>24.03.2015</a:t>
             </a:fld>
             <a:endParaRPr lang="ru-RU"/>
           </a:p>
@@ -1396,7 +1396,7 @@
               <a:pPr>
                 <a:defRPr/>
               </a:pPr>
-              <a:t>22.03.2015</a:t>
+              <a:t>24.03.2015</a:t>
             </a:fld>
             <a:endParaRPr lang="ru-RU"/>
           </a:p>
@@ -1544,7 +1544,7 @@
               <a:pPr>
                 <a:defRPr/>
               </a:pPr>
-              <a:t>22.03.2015</a:t>
+              <a:t>24.03.2015</a:t>
             </a:fld>
             <a:endParaRPr lang="ru-RU"/>
           </a:p>
@@ -1676,7 +1676,7 @@
               <a:pPr>
                 <a:defRPr/>
               </a:pPr>
-              <a:t>22.03.2015</a:t>
+              <a:t>24.03.2015</a:t>
             </a:fld>
             <a:endParaRPr lang="ru-RU"/>
           </a:p>
@@ -1969,7 +1969,7 @@
               <a:pPr>
                 <a:defRPr/>
               </a:pPr>
-              <a:t>22.03.2015</a:t>
+              <a:t>24.03.2015</a:t>
             </a:fld>
             <a:endParaRPr lang="ru-RU"/>
           </a:p>
@@ -2200,7 +2200,7 @@
               <a:pPr>
                 <a:defRPr/>
               </a:pPr>
-              <a:t>22.03.2015</a:t>
+              <a:t>24.03.2015</a:t>
             </a:fld>
             <a:endParaRPr lang="ru-RU"/>
           </a:p>
@@ -4478,22 +4478,1735 @@
             <a:pPr algn="ctr"/>
             <a:r>
               <a:rPr lang="ru-RU" dirty="0" smtClean="0"/>
-              <a:t>Задачи</a:t>
+              <a:t>Сложные климатические условия</a:t>
             </a:r>
             <a:endParaRPr lang="ru-RU" dirty="0"/>
           </a:p>
         </p:txBody>
       </p:sp>
+      <p:graphicFrame>
+        <p:nvGraphicFramePr>
+          <p:cNvPr id="9" name="Таблица 8"/>
+          <p:cNvGraphicFramePr>
+            <a:graphicFrameLocks noGrp="1"/>
+          </p:cNvGraphicFramePr>
+          <p:nvPr>
+            <p:extLst>
+              <p:ext uri="{D42A27DB-BD31-4B8C-83A1-F6EECF244321}">
+                <p14:modId xmlns:p14="http://schemas.microsoft.com/office/powerpoint/2010/main" val="59982523"/>
+              </p:ext>
+            </p:extLst>
+          </p:nvPr>
+        </p:nvGraphicFramePr>
+        <p:xfrm>
+          <a:off x="152401" y="902844"/>
+          <a:ext cx="6057899" cy="5853561"/>
+        </p:xfrm>
+        <a:graphic>
+          <a:graphicData uri="http://schemas.openxmlformats.org/drawingml/2006/table">
+            <a:tbl>
+              <a:tblPr firstRow="1" firstCol="1" bandRow="1">
+                <a:tableStyleId>{5C22544A-7EE6-4342-B048-85BDC9FD1C3A}</a:tableStyleId>
+              </a:tblPr>
+              <a:tblGrid>
+                <a:gridCol w="3024562"/>
+                <a:gridCol w="1471327"/>
+                <a:gridCol w="1562010"/>
+              </a:tblGrid>
+              <a:tr h="278741">
+                <a:tc>
+                  <a:txBody>
+                    <a:bodyPr/>
+                    <a:lstStyle/>
+                    <a:p>
+                      <a:pPr marL="0" marR="0" indent="0" algn="just">
+                        <a:lnSpc>
+                          <a:spcPct val="150000"/>
+                        </a:lnSpc>
+                        <a:spcBef>
+                          <a:spcPts val="0"/>
+                        </a:spcBef>
+                        <a:spcAft>
+                          <a:spcPts val="0"/>
+                        </a:spcAft>
+                      </a:pPr>
+                      <a:r>
+                        <a:rPr lang="ru-RU" sz="1300" dirty="0">
+                          <a:effectLst/>
+                        </a:rPr>
+                        <a:t>Датчик</a:t>
+                      </a:r>
+                      <a:endParaRPr lang="en-US" sz="1300" dirty="0">
+                        <a:effectLst/>
+                        <a:latin typeface="Times New Roman"/>
+                        <a:ea typeface="Times New Roman"/>
+                      </a:endParaRPr>
+                    </a:p>
+                  </a:txBody>
+                  <a:tcPr marL="30308" marR="30308" marT="0" marB="0"/>
+                </a:tc>
+                <a:tc>
+                  <a:txBody>
+                    <a:bodyPr/>
+                    <a:lstStyle/>
+                    <a:p>
+                      <a:pPr marL="0" marR="0" indent="0" algn="just">
+                        <a:lnSpc>
+                          <a:spcPct val="150000"/>
+                        </a:lnSpc>
+                        <a:spcBef>
+                          <a:spcPts val="0"/>
+                        </a:spcBef>
+                        <a:spcAft>
+                          <a:spcPts val="0"/>
+                        </a:spcAft>
+                      </a:pPr>
+                      <a:r>
+                        <a:rPr lang="ru-RU" sz="1300" dirty="0">
+                          <a:effectLst/>
+                        </a:rPr>
+                        <a:t>Погодные условия</a:t>
+                      </a:r>
+                      <a:endParaRPr lang="en-US" sz="1300" dirty="0">
+                        <a:effectLst/>
+                        <a:latin typeface="Times New Roman"/>
+                        <a:ea typeface="Times New Roman"/>
+                      </a:endParaRPr>
+                    </a:p>
+                  </a:txBody>
+                  <a:tcPr marL="30308" marR="30308" marT="0" marB="0"/>
+                </a:tc>
+                <a:tc>
+                  <a:txBody>
+                    <a:bodyPr/>
+                    <a:lstStyle/>
+                    <a:p>
+                      <a:pPr marL="0" marR="0" indent="0" algn="just">
+                        <a:lnSpc>
+                          <a:spcPct val="150000"/>
+                        </a:lnSpc>
+                        <a:spcBef>
+                          <a:spcPts val="0"/>
+                        </a:spcBef>
+                        <a:spcAft>
+                          <a:spcPts val="0"/>
+                        </a:spcAft>
+                      </a:pPr>
+                      <a:r>
+                        <a:rPr lang="ru-RU" sz="1300">
+                          <a:effectLst/>
+                        </a:rPr>
+                        <a:t>Применимость</a:t>
+                      </a:r>
+                      <a:endParaRPr lang="en-US" sz="1300">
+                        <a:effectLst/>
+                        <a:latin typeface="Times New Roman"/>
+                        <a:ea typeface="Times New Roman"/>
+                      </a:endParaRPr>
+                    </a:p>
+                  </a:txBody>
+                  <a:tcPr marL="30308" marR="30308" marT="0" marB="0"/>
+                </a:tc>
+              </a:tr>
+              <a:tr h="278741">
+                <a:tc rowSpan="4">
+                  <a:txBody>
+                    <a:bodyPr/>
+                    <a:lstStyle/>
+                    <a:p>
+                      <a:pPr marL="0" marR="0" indent="0" algn="just">
+                        <a:lnSpc>
+                          <a:spcPct val="150000"/>
+                        </a:lnSpc>
+                        <a:spcBef>
+                          <a:spcPts val="0"/>
+                        </a:spcBef>
+                        <a:spcAft>
+                          <a:spcPts val="0"/>
+                        </a:spcAft>
+                      </a:pPr>
+                      <a:r>
+                        <a:rPr lang="ru-RU" sz="1300" dirty="0">
+                          <a:effectLst/>
+                        </a:rPr>
+                        <a:t>Видеокамеры</a:t>
+                      </a:r>
+                      <a:endParaRPr lang="en-US" sz="1300" dirty="0">
+                        <a:effectLst/>
+                        <a:latin typeface="Times New Roman"/>
+                        <a:ea typeface="Times New Roman"/>
+                      </a:endParaRPr>
+                    </a:p>
+                  </a:txBody>
+                  <a:tcPr marL="30308" marR="30308" marT="0" marB="0"/>
+                </a:tc>
+                <a:tc>
+                  <a:txBody>
+                    <a:bodyPr/>
+                    <a:lstStyle/>
+                    <a:p>
+                      <a:pPr marL="0" marR="0" indent="0" algn="just">
+                        <a:lnSpc>
+                          <a:spcPct val="150000"/>
+                        </a:lnSpc>
+                        <a:spcBef>
+                          <a:spcPts val="0"/>
+                        </a:spcBef>
+                        <a:spcAft>
+                          <a:spcPts val="0"/>
+                        </a:spcAft>
+                      </a:pPr>
+                      <a:r>
+                        <a:rPr lang="ru-RU" sz="1100">
+                          <a:effectLst/>
+                        </a:rPr>
+                        <a:t>Полярная ночь</a:t>
+                      </a:r>
+                      <a:endParaRPr lang="en-US" sz="1100">
+                        <a:effectLst/>
+                        <a:latin typeface="Times New Roman"/>
+                        <a:ea typeface="Times New Roman"/>
+                      </a:endParaRPr>
+                    </a:p>
+                  </a:txBody>
+                  <a:tcPr marL="30308" marR="30308" marT="0" marB="0"/>
+                </a:tc>
+                <a:tc>
+                  <a:txBody>
+                    <a:bodyPr/>
+                    <a:lstStyle/>
+                    <a:p>
+                      <a:pPr marL="0" marR="0" indent="0" algn="ctr">
+                        <a:lnSpc>
+                          <a:spcPct val="150000"/>
+                        </a:lnSpc>
+                        <a:spcBef>
+                          <a:spcPts val="0"/>
+                        </a:spcBef>
+                        <a:spcAft>
+                          <a:spcPts val="0"/>
+                        </a:spcAft>
+                      </a:pPr>
+                      <a:r>
+                        <a:rPr lang="ru-RU" sz="1300">
+                          <a:effectLst/>
+                        </a:rPr>
+                        <a:t>-</a:t>
+                      </a:r>
+                      <a:endParaRPr lang="en-US" sz="1300">
+                        <a:effectLst/>
+                        <a:latin typeface="Times New Roman"/>
+                        <a:ea typeface="Times New Roman"/>
+                      </a:endParaRPr>
+                    </a:p>
+                  </a:txBody>
+                  <a:tcPr marL="30308" marR="30308" marT="0" marB="0"/>
+                </a:tc>
+              </a:tr>
+              <a:tr h="278741">
+                <a:tc vMerge="1">
+                  <a:txBody>
+                    <a:bodyPr/>
+                    <a:lstStyle/>
+                    <a:p>
+                      <a:endParaRPr lang="en-US"/>
+                    </a:p>
+                  </a:txBody>
+                  <a:tcPr/>
+                </a:tc>
+                <a:tc>
+                  <a:txBody>
+                    <a:bodyPr/>
+                    <a:lstStyle/>
+                    <a:p>
+                      <a:pPr marL="0" marR="0" indent="0" algn="just">
+                        <a:lnSpc>
+                          <a:spcPct val="150000"/>
+                        </a:lnSpc>
+                        <a:spcBef>
+                          <a:spcPts val="0"/>
+                        </a:spcBef>
+                        <a:spcAft>
+                          <a:spcPts val="0"/>
+                        </a:spcAft>
+                      </a:pPr>
+                      <a:r>
+                        <a:rPr lang="ru-RU" sz="1100">
+                          <a:effectLst/>
+                        </a:rPr>
+                        <a:t>Метель</a:t>
+                      </a:r>
+                      <a:endParaRPr lang="en-US" sz="1100">
+                        <a:effectLst/>
+                        <a:latin typeface="Times New Roman"/>
+                        <a:ea typeface="Times New Roman"/>
+                      </a:endParaRPr>
+                    </a:p>
+                  </a:txBody>
+                  <a:tcPr marL="30308" marR="30308" marT="0" marB="0"/>
+                </a:tc>
+                <a:tc>
+                  <a:txBody>
+                    <a:bodyPr/>
+                    <a:lstStyle/>
+                    <a:p>
+                      <a:pPr marL="0" marR="0" indent="0" algn="ctr">
+                        <a:lnSpc>
+                          <a:spcPct val="150000"/>
+                        </a:lnSpc>
+                        <a:spcBef>
+                          <a:spcPts val="0"/>
+                        </a:spcBef>
+                        <a:spcAft>
+                          <a:spcPts val="0"/>
+                        </a:spcAft>
+                      </a:pPr>
+                      <a:r>
+                        <a:rPr lang="ru-RU" sz="1300">
+                          <a:effectLst/>
+                        </a:rPr>
+                        <a:t>-</a:t>
+                      </a:r>
+                      <a:endParaRPr lang="en-US" sz="1300">
+                        <a:effectLst/>
+                        <a:latin typeface="Times New Roman"/>
+                        <a:ea typeface="Times New Roman"/>
+                      </a:endParaRPr>
+                    </a:p>
+                  </a:txBody>
+                  <a:tcPr marL="30308" marR="30308" marT="0" marB="0"/>
+                </a:tc>
+              </a:tr>
+              <a:tr h="278741">
+                <a:tc vMerge="1">
+                  <a:txBody>
+                    <a:bodyPr/>
+                    <a:lstStyle/>
+                    <a:p>
+                      <a:endParaRPr lang="en-US"/>
+                    </a:p>
+                  </a:txBody>
+                  <a:tcPr/>
+                </a:tc>
+                <a:tc>
+                  <a:txBody>
+                    <a:bodyPr/>
+                    <a:lstStyle/>
+                    <a:p>
+                      <a:pPr marL="0" marR="0" indent="0" algn="just">
+                        <a:lnSpc>
+                          <a:spcPct val="150000"/>
+                        </a:lnSpc>
+                        <a:spcBef>
+                          <a:spcPts val="0"/>
+                        </a:spcBef>
+                        <a:spcAft>
+                          <a:spcPts val="0"/>
+                        </a:spcAft>
+                      </a:pPr>
+                      <a:r>
+                        <a:rPr lang="ru-RU" sz="1100">
+                          <a:effectLst/>
+                        </a:rPr>
+                        <a:t>Сильный ветер</a:t>
+                      </a:r>
+                      <a:endParaRPr lang="en-US" sz="1100">
+                        <a:effectLst/>
+                        <a:latin typeface="Times New Roman"/>
+                        <a:ea typeface="Times New Roman"/>
+                      </a:endParaRPr>
+                    </a:p>
+                  </a:txBody>
+                  <a:tcPr marL="30308" marR="30308" marT="0" marB="0"/>
+                </a:tc>
+                <a:tc>
+                  <a:txBody>
+                    <a:bodyPr/>
+                    <a:lstStyle/>
+                    <a:p>
+                      <a:pPr marL="0" marR="0" indent="0" algn="ctr">
+                        <a:lnSpc>
+                          <a:spcPct val="150000"/>
+                        </a:lnSpc>
+                        <a:spcBef>
+                          <a:spcPts val="0"/>
+                        </a:spcBef>
+                        <a:spcAft>
+                          <a:spcPts val="0"/>
+                        </a:spcAft>
+                      </a:pPr>
+                      <a:r>
+                        <a:rPr lang="ru-RU" sz="1300">
+                          <a:effectLst/>
+                        </a:rPr>
+                        <a:t>+</a:t>
+                      </a:r>
+                      <a:endParaRPr lang="en-US" sz="1300">
+                        <a:effectLst/>
+                        <a:latin typeface="Times New Roman"/>
+                        <a:ea typeface="Times New Roman"/>
+                      </a:endParaRPr>
+                    </a:p>
+                  </a:txBody>
+                  <a:tcPr marL="30308" marR="30308" marT="0" marB="0"/>
+                </a:tc>
+              </a:tr>
+              <a:tr h="278741">
+                <a:tc vMerge="1">
+                  <a:txBody>
+                    <a:bodyPr/>
+                    <a:lstStyle/>
+                    <a:p>
+                      <a:endParaRPr lang="en-US"/>
+                    </a:p>
+                  </a:txBody>
+                  <a:tcPr/>
+                </a:tc>
+                <a:tc>
+                  <a:txBody>
+                    <a:bodyPr/>
+                    <a:lstStyle/>
+                    <a:p>
+                      <a:pPr marL="0" marR="0" indent="0" algn="just">
+                        <a:lnSpc>
+                          <a:spcPct val="150000"/>
+                        </a:lnSpc>
+                        <a:spcBef>
+                          <a:spcPts val="0"/>
+                        </a:spcBef>
+                        <a:spcAft>
+                          <a:spcPts val="0"/>
+                        </a:spcAft>
+                      </a:pPr>
+                      <a:r>
+                        <a:rPr lang="ru-RU" sz="1100">
+                          <a:effectLst/>
+                        </a:rPr>
+                        <a:t>Качка</a:t>
+                      </a:r>
+                      <a:endParaRPr lang="en-US" sz="1100">
+                        <a:effectLst/>
+                        <a:latin typeface="Times New Roman"/>
+                        <a:ea typeface="Times New Roman"/>
+                      </a:endParaRPr>
+                    </a:p>
+                  </a:txBody>
+                  <a:tcPr marL="30308" marR="30308" marT="0" marB="0"/>
+                </a:tc>
+                <a:tc>
+                  <a:txBody>
+                    <a:bodyPr/>
+                    <a:lstStyle/>
+                    <a:p>
+                      <a:pPr marL="0" marR="0" indent="0" algn="ctr">
+                        <a:lnSpc>
+                          <a:spcPct val="150000"/>
+                        </a:lnSpc>
+                        <a:spcBef>
+                          <a:spcPts val="0"/>
+                        </a:spcBef>
+                        <a:spcAft>
+                          <a:spcPts val="0"/>
+                        </a:spcAft>
+                      </a:pPr>
+                      <a:r>
+                        <a:rPr lang="ru-RU" sz="1300">
+                          <a:effectLst/>
+                        </a:rPr>
+                        <a:t>+</a:t>
+                      </a:r>
+                      <a:endParaRPr lang="en-US" sz="1300">
+                        <a:effectLst/>
+                        <a:latin typeface="Times New Roman"/>
+                        <a:ea typeface="Times New Roman"/>
+                      </a:endParaRPr>
+                    </a:p>
+                  </a:txBody>
+                  <a:tcPr marL="30308" marR="30308" marT="0" marB="0"/>
+                </a:tc>
+              </a:tr>
+              <a:tr h="278741">
+                <a:tc rowSpan="4">
+                  <a:txBody>
+                    <a:bodyPr/>
+                    <a:lstStyle/>
+                    <a:p>
+                      <a:pPr marL="0" marR="0" indent="0" algn="just">
+                        <a:lnSpc>
+                          <a:spcPct val="150000"/>
+                        </a:lnSpc>
+                        <a:spcBef>
+                          <a:spcPts val="0"/>
+                        </a:spcBef>
+                        <a:spcAft>
+                          <a:spcPts val="0"/>
+                        </a:spcAft>
+                      </a:pPr>
+                      <a:r>
+                        <a:rPr lang="ru-RU" sz="1300" dirty="0">
+                          <a:effectLst/>
+                        </a:rPr>
+                        <a:t>Ультразвуковой дальномер </a:t>
+                      </a:r>
+                      <a:endParaRPr lang="en-US" sz="1300" dirty="0">
+                        <a:effectLst/>
+                        <a:latin typeface="Times New Roman"/>
+                        <a:ea typeface="Times New Roman"/>
+                      </a:endParaRPr>
+                    </a:p>
+                  </a:txBody>
+                  <a:tcPr marL="30308" marR="30308" marT="0" marB="0"/>
+                </a:tc>
+                <a:tc>
+                  <a:txBody>
+                    <a:bodyPr/>
+                    <a:lstStyle/>
+                    <a:p>
+                      <a:pPr marL="0" marR="0" indent="0" algn="just">
+                        <a:lnSpc>
+                          <a:spcPct val="150000"/>
+                        </a:lnSpc>
+                        <a:spcBef>
+                          <a:spcPts val="0"/>
+                        </a:spcBef>
+                        <a:spcAft>
+                          <a:spcPts val="0"/>
+                        </a:spcAft>
+                      </a:pPr>
+                      <a:r>
+                        <a:rPr lang="ru-RU" sz="1100">
+                          <a:effectLst/>
+                        </a:rPr>
+                        <a:t>Полярная ночь</a:t>
+                      </a:r>
+                      <a:endParaRPr lang="en-US" sz="1100">
+                        <a:effectLst/>
+                        <a:latin typeface="Times New Roman"/>
+                        <a:ea typeface="Times New Roman"/>
+                      </a:endParaRPr>
+                    </a:p>
+                  </a:txBody>
+                  <a:tcPr marL="30308" marR="30308" marT="0" marB="0"/>
+                </a:tc>
+                <a:tc>
+                  <a:txBody>
+                    <a:bodyPr/>
+                    <a:lstStyle/>
+                    <a:p>
+                      <a:pPr marL="0" marR="0" indent="0" algn="ctr">
+                        <a:lnSpc>
+                          <a:spcPct val="150000"/>
+                        </a:lnSpc>
+                        <a:spcBef>
+                          <a:spcPts val="0"/>
+                        </a:spcBef>
+                        <a:spcAft>
+                          <a:spcPts val="0"/>
+                        </a:spcAft>
+                      </a:pPr>
+                      <a:r>
+                        <a:rPr lang="ru-RU" sz="1300">
+                          <a:effectLst/>
+                        </a:rPr>
+                        <a:t>+</a:t>
+                      </a:r>
+                      <a:endParaRPr lang="en-US" sz="1300">
+                        <a:effectLst/>
+                        <a:latin typeface="Times New Roman"/>
+                        <a:ea typeface="Times New Roman"/>
+                      </a:endParaRPr>
+                    </a:p>
+                  </a:txBody>
+                  <a:tcPr marL="30308" marR="30308" marT="0" marB="0"/>
+                </a:tc>
+              </a:tr>
+              <a:tr h="278741">
+                <a:tc vMerge="1">
+                  <a:txBody>
+                    <a:bodyPr/>
+                    <a:lstStyle/>
+                    <a:p>
+                      <a:endParaRPr lang="en-US"/>
+                    </a:p>
+                  </a:txBody>
+                  <a:tcPr/>
+                </a:tc>
+                <a:tc>
+                  <a:txBody>
+                    <a:bodyPr/>
+                    <a:lstStyle/>
+                    <a:p>
+                      <a:pPr marL="0" marR="0" indent="0" algn="just">
+                        <a:lnSpc>
+                          <a:spcPct val="150000"/>
+                        </a:lnSpc>
+                        <a:spcBef>
+                          <a:spcPts val="0"/>
+                        </a:spcBef>
+                        <a:spcAft>
+                          <a:spcPts val="0"/>
+                        </a:spcAft>
+                      </a:pPr>
+                      <a:r>
+                        <a:rPr lang="ru-RU" sz="1100" dirty="0">
+                          <a:effectLst/>
+                        </a:rPr>
+                        <a:t>Метель</a:t>
+                      </a:r>
+                      <a:endParaRPr lang="en-US" sz="1100" dirty="0">
+                        <a:effectLst/>
+                        <a:latin typeface="Times New Roman"/>
+                        <a:ea typeface="Times New Roman"/>
+                      </a:endParaRPr>
+                    </a:p>
+                  </a:txBody>
+                  <a:tcPr marL="30308" marR="30308" marT="0" marB="0"/>
+                </a:tc>
+                <a:tc>
+                  <a:txBody>
+                    <a:bodyPr/>
+                    <a:lstStyle/>
+                    <a:p>
+                      <a:pPr marL="0" marR="0" indent="0" algn="ctr">
+                        <a:lnSpc>
+                          <a:spcPct val="150000"/>
+                        </a:lnSpc>
+                        <a:spcBef>
+                          <a:spcPts val="0"/>
+                        </a:spcBef>
+                        <a:spcAft>
+                          <a:spcPts val="0"/>
+                        </a:spcAft>
+                      </a:pPr>
+                      <a:r>
+                        <a:rPr lang="ru-RU" sz="1300">
+                          <a:effectLst/>
+                        </a:rPr>
+                        <a:t>-</a:t>
+                      </a:r>
+                      <a:endParaRPr lang="en-US" sz="1300">
+                        <a:effectLst/>
+                        <a:latin typeface="Times New Roman"/>
+                        <a:ea typeface="Times New Roman"/>
+                      </a:endParaRPr>
+                    </a:p>
+                  </a:txBody>
+                  <a:tcPr marL="30308" marR="30308" marT="0" marB="0"/>
+                </a:tc>
+              </a:tr>
+              <a:tr h="278741">
+                <a:tc vMerge="1">
+                  <a:txBody>
+                    <a:bodyPr/>
+                    <a:lstStyle/>
+                    <a:p>
+                      <a:endParaRPr lang="en-US"/>
+                    </a:p>
+                  </a:txBody>
+                  <a:tcPr/>
+                </a:tc>
+                <a:tc>
+                  <a:txBody>
+                    <a:bodyPr/>
+                    <a:lstStyle/>
+                    <a:p>
+                      <a:pPr marL="0" marR="0" indent="0" algn="just">
+                        <a:lnSpc>
+                          <a:spcPct val="150000"/>
+                        </a:lnSpc>
+                        <a:spcBef>
+                          <a:spcPts val="0"/>
+                        </a:spcBef>
+                        <a:spcAft>
+                          <a:spcPts val="0"/>
+                        </a:spcAft>
+                      </a:pPr>
+                      <a:r>
+                        <a:rPr lang="ru-RU" sz="1100">
+                          <a:effectLst/>
+                        </a:rPr>
+                        <a:t>Сильный ветер</a:t>
+                      </a:r>
+                      <a:endParaRPr lang="en-US" sz="1100">
+                        <a:effectLst/>
+                        <a:latin typeface="Times New Roman"/>
+                        <a:ea typeface="Times New Roman"/>
+                      </a:endParaRPr>
+                    </a:p>
+                  </a:txBody>
+                  <a:tcPr marL="30308" marR="30308" marT="0" marB="0"/>
+                </a:tc>
+                <a:tc>
+                  <a:txBody>
+                    <a:bodyPr/>
+                    <a:lstStyle/>
+                    <a:p>
+                      <a:pPr marL="0" marR="0" indent="0" algn="ctr">
+                        <a:lnSpc>
+                          <a:spcPct val="150000"/>
+                        </a:lnSpc>
+                        <a:spcBef>
+                          <a:spcPts val="0"/>
+                        </a:spcBef>
+                        <a:spcAft>
+                          <a:spcPts val="0"/>
+                        </a:spcAft>
+                      </a:pPr>
+                      <a:r>
+                        <a:rPr lang="ru-RU" sz="1300">
+                          <a:effectLst/>
+                        </a:rPr>
+                        <a:t>-</a:t>
+                      </a:r>
+                      <a:endParaRPr lang="en-US" sz="1300">
+                        <a:effectLst/>
+                        <a:latin typeface="Times New Roman"/>
+                        <a:ea typeface="Times New Roman"/>
+                      </a:endParaRPr>
+                    </a:p>
+                  </a:txBody>
+                  <a:tcPr marL="30308" marR="30308" marT="0" marB="0"/>
+                </a:tc>
+              </a:tr>
+              <a:tr h="278741">
+                <a:tc vMerge="1">
+                  <a:txBody>
+                    <a:bodyPr/>
+                    <a:lstStyle/>
+                    <a:p>
+                      <a:endParaRPr lang="en-US"/>
+                    </a:p>
+                  </a:txBody>
+                  <a:tcPr/>
+                </a:tc>
+                <a:tc>
+                  <a:txBody>
+                    <a:bodyPr/>
+                    <a:lstStyle/>
+                    <a:p>
+                      <a:pPr marL="0" marR="0" indent="0" algn="just">
+                        <a:lnSpc>
+                          <a:spcPct val="150000"/>
+                        </a:lnSpc>
+                        <a:spcBef>
+                          <a:spcPts val="0"/>
+                        </a:spcBef>
+                        <a:spcAft>
+                          <a:spcPts val="0"/>
+                        </a:spcAft>
+                      </a:pPr>
+                      <a:r>
+                        <a:rPr lang="ru-RU" sz="1100">
+                          <a:effectLst/>
+                        </a:rPr>
+                        <a:t>Качка</a:t>
+                      </a:r>
+                      <a:endParaRPr lang="en-US" sz="1100">
+                        <a:effectLst/>
+                        <a:latin typeface="Times New Roman"/>
+                        <a:ea typeface="Times New Roman"/>
+                      </a:endParaRPr>
+                    </a:p>
+                  </a:txBody>
+                  <a:tcPr marL="30308" marR="30308" marT="0" marB="0"/>
+                </a:tc>
+                <a:tc>
+                  <a:txBody>
+                    <a:bodyPr/>
+                    <a:lstStyle/>
+                    <a:p>
+                      <a:pPr marL="0" marR="0" indent="0" algn="ctr">
+                        <a:lnSpc>
+                          <a:spcPct val="150000"/>
+                        </a:lnSpc>
+                        <a:spcBef>
+                          <a:spcPts val="0"/>
+                        </a:spcBef>
+                        <a:spcAft>
+                          <a:spcPts val="0"/>
+                        </a:spcAft>
+                      </a:pPr>
+                      <a:r>
+                        <a:rPr lang="ru-RU" sz="1300">
+                          <a:effectLst/>
+                        </a:rPr>
+                        <a:t>+</a:t>
+                      </a:r>
+                      <a:endParaRPr lang="en-US" sz="1300">
+                        <a:effectLst/>
+                        <a:latin typeface="Times New Roman"/>
+                        <a:ea typeface="Times New Roman"/>
+                      </a:endParaRPr>
+                    </a:p>
+                  </a:txBody>
+                  <a:tcPr marL="30308" marR="30308" marT="0" marB="0"/>
+                </a:tc>
+              </a:tr>
+              <a:tr h="278741">
+                <a:tc rowSpan="4">
+                  <a:txBody>
+                    <a:bodyPr/>
+                    <a:lstStyle/>
+                    <a:p>
+                      <a:pPr marL="0" marR="0" indent="0" algn="just">
+                        <a:lnSpc>
+                          <a:spcPct val="150000"/>
+                        </a:lnSpc>
+                        <a:spcBef>
+                          <a:spcPts val="0"/>
+                        </a:spcBef>
+                        <a:spcAft>
+                          <a:spcPts val="0"/>
+                        </a:spcAft>
+                      </a:pPr>
+                      <a:r>
+                        <a:rPr lang="ru-RU" sz="1300">
+                          <a:effectLst/>
+                        </a:rPr>
+                        <a:t>Лазерный дальномер</a:t>
+                      </a:r>
+                      <a:endParaRPr lang="en-US" sz="1300">
+                        <a:effectLst/>
+                        <a:latin typeface="Times New Roman"/>
+                        <a:ea typeface="Times New Roman"/>
+                      </a:endParaRPr>
+                    </a:p>
+                  </a:txBody>
+                  <a:tcPr marL="30308" marR="30308" marT="0" marB="0"/>
+                </a:tc>
+                <a:tc>
+                  <a:txBody>
+                    <a:bodyPr/>
+                    <a:lstStyle/>
+                    <a:p>
+                      <a:pPr marL="0" marR="0" indent="0" algn="just">
+                        <a:lnSpc>
+                          <a:spcPct val="150000"/>
+                        </a:lnSpc>
+                        <a:spcBef>
+                          <a:spcPts val="0"/>
+                        </a:spcBef>
+                        <a:spcAft>
+                          <a:spcPts val="0"/>
+                        </a:spcAft>
+                      </a:pPr>
+                      <a:r>
+                        <a:rPr lang="ru-RU" sz="1100">
+                          <a:effectLst/>
+                        </a:rPr>
+                        <a:t>Полярная ночь</a:t>
+                      </a:r>
+                      <a:endParaRPr lang="en-US" sz="1100">
+                        <a:effectLst/>
+                        <a:latin typeface="Times New Roman"/>
+                        <a:ea typeface="Times New Roman"/>
+                      </a:endParaRPr>
+                    </a:p>
+                  </a:txBody>
+                  <a:tcPr marL="30308" marR="30308" marT="0" marB="0"/>
+                </a:tc>
+                <a:tc>
+                  <a:txBody>
+                    <a:bodyPr/>
+                    <a:lstStyle/>
+                    <a:p>
+                      <a:pPr marL="0" marR="0" indent="0" algn="ctr">
+                        <a:lnSpc>
+                          <a:spcPct val="150000"/>
+                        </a:lnSpc>
+                        <a:spcBef>
+                          <a:spcPts val="0"/>
+                        </a:spcBef>
+                        <a:spcAft>
+                          <a:spcPts val="0"/>
+                        </a:spcAft>
+                      </a:pPr>
+                      <a:r>
+                        <a:rPr lang="ru-RU" sz="1300">
+                          <a:effectLst/>
+                        </a:rPr>
+                        <a:t>+</a:t>
+                      </a:r>
+                      <a:endParaRPr lang="en-US" sz="1300">
+                        <a:effectLst/>
+                        <a:latin typeface="Times New Roman"/>
+                        <a:ea typeface="Times New Roman"/>
+                      </a:endParaRPr>
+                    </a:p>
+                  </a:txBody>
+                  <a:tcPr marL="30308" marR="30308" marT="0" marB="0"/>
+                </a:tc>
+              </a:tr>
+              <a:tr h="278741">
+                <a:tc vMerge="1">
+                  <a:txBody>
+                    <a:bodyPr/>
+                    <a:lstStyle/>
+                    <a:p>
+                      <a:endParaRPr lang="en-US"/>
+                    </a:p>
+                  </a:txBody>
+                  <a:tcPr/>
+                </a:tc>
+                <a:tc>
+                  <a:txBody>
+                    <a:bodyPr/>
+                    <a:lstStyle/>
+                    <a:p>
+                      <a:pPr marL="0" marR="0" indent="0" algn="just">
+                        <a:lnSpc>
+                          <a:spcPct val="150000"/>
+                        </a:lnSpc>
+                        <a:spcBef>
+                          <a:spcPts val="0"/>
+                        </a:spcBef>
+                        <a:spcAft>
+                          <a:spcPts val="0"/>
+                        </a:spcAft>
+                      </a:pPr>
+                      <a:r>
+                        <a:rPr lang="ru-RU" sz="1100">
+                          <a:effectLst/>
+                        </a:rPr>
+                        <a:t>Метель</a:t>
+                      </a:r>
+                      <a:endParaRPr lang="en-US" sz="1100">
+                        <a:effectLst/>
+                        <a:latin typeface="Times New Roman"/>
+                        <a:ea typeface="Times New Roman"/>
+                      </a:endParaRPr>
+                    </a:p>
+                  </a:txBody>
+                  <a:tcPr marL="30308" marR="30308" marT="0" marB="0"/>
+                </a:tc>
+                <a:tc>
+                  <a:txBody>
+                    <a:bodyPr/>
+                    <a:lstStyle/>
+                    <a:p>
+                      <a:pPr marL="0" marR="0" indent="0" algn="ctr">
+                        <a:lnSpc>
+                          <a:spcPct val="150000"/>
+                        </a:lnSpc>
+                        <a:spcBef>
+                          <a:spcPts val="0"/>
+                        </a:spcBef>
+                        <a:spcAft>
+                          <a:spcPts val="0"/>
+                        </a:spcAft>
+                      </a:pPr>
+                      <a:r>
+                        <a:rPr lang="ru-RU" sz="1300">
+                          <a:effectLst/>
+                        </a:rPr>
+                        <a:t>-</a:t>
+                      </a:r>
+                      <a:endParaRPr lang="en-US" sz="1300">
+                        <a:effectLst/>
+                        <a:latin typeface="Times New Roman"/>
+                        <a:ea typeface="Times New Roman"/>
+                      </a:endParaRPr>
+                    </a:p>
+                  </a:txBody>
+                  <a:tcPr marL="30308" marR="30308" marT="0" marB="0"/>
+                </a:tc>
+              </a:tr>
+              <a:tr h="278741">
+                <a:tc vMerge="1">
+                  <a:txBody>
+                    <a:bodyPr/>
+                    <a:lstStyle/>
+                    <a:p>
+                      <a:endParaRPr lang="en-US"/>
+                    </a:p>
+                  </a:txBody>
+                  <a:tcPr/>
+                </a:tc>
+                <a:tc>
+                  <a:txBody>
+                    <a:bodyPr/>
+                    <a:lstStyle/>
+                    <a:p>
+                      <a:pPr marL="0" marR="0" indent="0" algn="just">
+                        <a:lnSpc>
+                          <a:spcPct val="150000"/>
+                        </a:lnSpc>
+                        <a:spcBef>
+                          <a:spcPts val="0"/>
+                        </a:spcBef>
+                        <a:spcAft>
+                          <a:spcPts val="0"/>
+                        </a:spcAft>
+                      </a:pPr>
+                      <a:r>
+                        <a:rPr lang="ru-RU" sz="1100">
+                          <a:effectLst/>
+                        </a:rPr>
+                        <a:t>Сильный ветер</a:t>
+                      </a:r>
+                      <a:endParaRPr lang="en-US" sz="1100">
+                        <a:effectLst/>
+                        <a:latin typeface="Times New Roman"/>
+                        <a:ea typeface="Times New Roman"/>
+                      </a:endParaRPr>
+                    </a:p>
+                  </a:txBody>
+                  <a:tcPr marL="30308" marR="30308" marT="0" marB="0"/>
+                </a:tc>
+                <a:tc>
+                  <a:txBody>
+                    <a:bodyPr/>
+                    <a:lstStyle/>
+                    <a:p>
+                      <a:pPr marL="0" marR="0" indent="0" algn="ctr">
+                        <a:lnSpc>
+                          <a:spcPct val="150000"/>
+                        </a:lnSpc>
+                        <a:spcBef>
+                          <a:spcPts val="0"/>
+                        </a:spcBef>
+                        <a:spcAft>
+                          <a:spcPts val="0"/>
+                        </a:spcAft>
+                      </a:pPr>
+                      <a:r>
+                        <a:rPr lang="ru-RU" sz="1300">
+                          <a:effectLst/>
+                        </a:rPr>
+                        <a:t>+</a:t>
+                      </a:r>
+                      <a:endParaRPr lang="en-US" sz="1300">
+                        <a:effectLst/>
+                        <a:latin typeface="Times New Roman"/>
+                        <a:ea typeface="Times New Roman"/>
+                      </a:endParaRPr>
+                    </a:p>
+                  </a:txBody>
+                  <a:tcPr marL="30308" marR="30308" marT="0" marB="0"/>
+                </a:tc>
+              </a:tr>
+              <a:tr h="278741">
+                <a:tc vMerge="1">
+                  <a:txBody>
+                    <a:bodyPr/>
+                    <a:lstStyle/>
+                    <a:p>
+                      <a:endParaRPr lang="en-US"/>
+                    </a:p>
+                  </a:txBody>
+                  <a:tcPr/>
+                </a:tc>
+                <a:tc>
+                  <a:txBody>
+                    <a:bodyPr/>
+                    <a:lstStyle/>
+                    <a:p>
+                      <a:pPr marL="0" marR="0" indent="0" algn="just">
+                        <a:lnSpc>
+                          <a:spcPct val="150000"/>
+                        </a:lnSpc>
+                        <a:spcBef>
+                          <a:spcPts val="0"/>
+                        </a:spcBef>
+                        <a:spcAft>
+                          <a:spcPts val="0"/>
+                        </a:spcAft>
+                      </a:pPr>
+                      <a:r>
+                        <a:rPr lang="ru-RU" sz="1100" dirty="0">
+                          <a:effectLst/>
+                        </a:rPr>
+                        <a:t>Качка</a:t>
+                      </a:r>
+                      <a:endParaRPr lang="en-US" sz="1100" dirty="0">
+                        <a:effectLst/>
+                        <a:latin typeface="Times New Roman"/>
+                        <a:ea typeface="Times New Roman"/>
+                      </a:endParaRPr>
+                    </a:p>
+                  </a:txBody>
+                  <a:tcPr marL="30308" marR="30308" marT="0" marB="0"/>
+                </a:tc>
+                <a:tc>
+                  <a:txBody>
+                    <a:bodyPr/>
+                    <a:lstStyle/>
+                    <a:p>
+                      <a:pPr marL="0" marR="0" indent="0" algn="ctr">
+                        <a:lnSpc>
+                          <a:spcPct val="150000"/>
+                        </a:lnSpc>
+                        <a:spcBef>
+                          <a:spcPts val="0"/>
+                        </a:spcBef>
+                        <a:spcAft>
+                          <a:spcPts val="0"/>
+                        </a:spcAft>
+                      </a:pPr>
+                      <a:r>
+                        <a:rPr lang="ru-RU" sz="1300">
+                          <a:effectLst/>
+                        </a:rPr>
+                        <a:t>+</a:t>
+                      </a:r>
+                      <a:endParaRPr lang="en-US" sz="1300">
+                        <a:effectLst/>
+                        <a:latin typeface="Times New Roman"/>
+                        <a:ea typeface="Times New Roman"/>
+                      </a:endParaRPr>
+                    </a:p>
+                  </a:txBody>
+                  <a:tcPr marL="30308" marR="30308" marT="0" marB="0"/>
+                </a:tc>
+              </a:tr>
+              <a:tr h="278741">
+                <a:tc rowSpan="4">
+                  <a:txBody>
+                    <a:bodyPr/>
+                    <a:lstStyle/>
+                    <a:p>
+                      <a:pPr marL="0" marR="0" indent="0" algn="just">
+                        <a:lnSpc>
+                          <a:spcPct val="150000"/>
+                        </a:lnSpc>
+                        <a:spcBef>
+                          <a:spcPts val="0"/>
+                        </a:spcBef>
+                        <a:spcAft>
+                          <a:spcPts val="0"/>
+                        </a:spcAft>
+                      </a:pPr>
+                      <a:r>
+                        <a:rPr lang="ru-RU" sz="1300">
+                          <a:effectLst/>
+                        </a:rPr>
+                        <a:t>Глобальная система навигации</a:t>
+                      </a:r>
+                      <a:endParaRPr lang="en-US" sz="1300">
+                        <a:effectLst/>
+                        <a:latin typeface="Times New Roman"/>
+                        <a:ea typeface="Times New Roman"/>
+                      </a:endParaRPr>
+                    </a:p>
+                  </a:txBody>
+                  <a:tcPr marL="30308" marR="30308" marT="0" marB="0"/>
+                </a:tc>
+                <a:tc>
+                  <a:txBody>
+                    <a:bodyPr/>
+                    <a:lstStyle/>
+                    <a:p>
+                      <a:pPr marL="0" marR="0" indent="0" algn="just">
+                        <a:lnSpc>
+                          <a:spcPct val="150000"/>
+                        </a:lnSpc>
+                        <a:spcBef>
+                          <a:spcPts val="0"/>
+                        </a:spcBef>
+                        <a:spcAft>
+                          <a:spcPts val="0"/>
+                        </a:spcAft>
+                      </a:pPr>
+                      <a:r>
+                        <a:rPr lang="ru-RU" sz="1100">
+                          <a:effectLst/>
+                        </a:rPr>
+                        <a:t>Полярная ночь</a:t>
+                      </a:r>
+                      <a:endParaRPr lang="en-US" sz="1100">
+                        <a:effectLst/>
+                        <a:latin typeface="Times New Roman"/>
+                        <a:ea typeface="Times New Roman"/>
+                      </a:endParaRPr>
+                    </a:p>
+                  </a:txBody>
+                  <a:tcPr marL="30308" marR="30308" marT="0" marB="0"/>
+                </a:tc>
+                <a:tc>
+                  <a:txBody>
+                    <a:bodyPr/>
+                    <a:lstStyle/>
+                    <a:p>
+                      <a:pPr marL="0" marR="0" indent="0" algn="ctr">
+                        <a:lnSpc>
+                          <a:spcPct val="150000"/>
+                        </a:lnSpc>
+                        <a:spcBef>
+                          <a:spcPts val="0"/>
+                        </a:spcBef>
+                        <a:spcAft>
+                          <a:spcPts val="0"/>
+                        </a:spcAft>
+                      </a:pPr>
+                      <a:r>
+                        <a:rPr lang="ru-RU" sz="1300">
+                          <a:effectLst/>
+                        </a:rPr>
+                        <a:t>+</a:t>
+                      </a:r>
+                      <a:endParaRPr lang="en-US" sz="1300">
+                        <a:effectLst/>
+                        <a:latin typeface="Times New Roman"/>
+                        <a:ea typeface="Times New Roman"/>
+                      </a:endParaRPr>
+                    </a:p>
+                  </a:txBody>
+                  <a:tcPr marL="30308" marR="30308" marT="0" marB="0"/>
+                </a:tc>
+              </a:tr>
+              <a:tr h="278741">
+                <a:tc vMerge="1">
+                  <a:txBody>
+                    <a:bodyPr/>
+                    <a:lstStyle/>
+                    <a:p>
+                      <a:endParaRPr lang="en-US"/>
+                    </a:p>
+                  </a:txBody>
+                  <a:tcPr/>
+                </a:tc>
+                <a:tc>
+                  <a:txBody>
+                    <a:bodyPr/>
+                    <a:lstStyle/>
+                    <a:p>
+                      <a:pPr marL="0" marR="0" indent="0" algn="just">
+                        <a:lnSpc>
+                          <a:spcPct val="150000"/>
+                        </a:lnSpc>
+                        <a:spcBef>
+                          <a:spcPts val="0"/>
+                        </a:spcBef>
+                        <a:spcAft>
+                          <a:spcPts val="0"/>
+                        </a:spcAft>
+                      </a:pPr>
+                      <a:r>
+                        <a:rPr lang="ru-RU" sz="1100">
+                          <a:effectLst/>
+                        </a:rPr>
+                        <a:t>Метель</a:t>
+                      </a:r>
+                      <a:endParaRPr lang="en-US" sz="1100">
+                        <a:effectLst/>
+                        <a:latin typeface="Times New Roman"/>
+                        <a:ea typeface="Times New Roman"/>
+                      </a:endParaRPr>
+                    </a:p>
+                  </a:txBody>
+                  <a:tcPr marL="30308" marR="30308" marT="0" marB="0"/>
+                </a:tc>
+                <a:tc>
+                  <a:txBody>
+                    <a:bodyPr/>
+                    <a:lstStyle/>
+                    <a:p>
+                      <a:pPr marL="0" marR="0" indent="0" algn="ctr">
+                        <a:lnSpc>
+                          <a:spcPct val="150000"/>
+                        </a:lnSpc>
+                        <a:spcBef>
+                          <a:spcPts val="0"/>
+                        </a:spcBef>
+                        <a:spcAft>
+                          <a:spcPts val="0"/>
+                        </a:spcAft>
+                      </a:pPr>
+                      <a:r>
+                        <a:rPr lang="ru-RU" sz="1300">
+                          <a:effectLst/>
+                        </a:rPr>
+                        <a:t>+</a:t>
+                      </a:r>
+                      <a:endParaRPr lang="en-US" sz="1300">
+                        <a:effectLst/>
+                        <a:latin typeface="Times New Roman"/>
+                        <a:ea typeface="Times New Roman"/>
+                      </a:endParaRPr>
+                    </a:p>
+                  </a:txBody>
+                  <a:tcPr marL="30308" marR="30308" marT="0" marB="0"/>
+                </a:tc>
+              </a:tr>
+              <a:tr h="278741">
+                <a:tc vMerge="1">
+                  <a:txBody>
+                    <a:bodyPr/>
+                    <a:lstStyle/>
+                    <a:p>
+                      <a:endParaRPr lang="en-US"/>
+                    </a:p>
+                  </a:txBody>
+                  <a:tcPr/>
+                </a:tc>
+                <a:tc>
+                  <a:txBody>
+                    <a:bodyPr/>
+                    <a:lstStyle/>
+                    <a:p>
+                      <a:pPr marL="0" marR="0" indent="0" algn="just">
+                        <a:lnSpc>
+                          <a:spcPct val="150000"/>
+                        </a:lnSpc>
+                        <a:spcBef>
+                          <a:spcPts val="0"/>
+                        </a:spcBef>
+                        <a:spcAft>
+                          <a:spcPts val="0"/>
+                        </a:spcAft>
+                      </a:pPr>
+                      <a:r>
+                        <a:rPr lang="ru-RU" sz="1100">
+                          <a:effectLst/>
+                        </a:rPr>
+                        <a:t>Сильный ветер</a:t>
+                      </a:r>
+                      <a:endParaRPr lang="en-US" sz="1100">
+                        <a:effectLst/>
+                        <a:latin typeface="Times New Roman"/>
+                        <a:ea typeface="Times New Roman"/>
+                      </a:endParaRPr>
+                    </a:p>
+                  </a:txBody>
+                  <a:tcPr marL="30308" marR="30308" marT="0" marB="0"/>
+                </a:tc>
+                <a:tc>
+                  <a:txBody>
+                    <a:bodyPr/>
+                    <a:lstStyle/>
+                    <a:p>
+                      <a:pPr marL="0" marR="0" indent="0" algn="ctr">
+                        <a:lnSpc>
+                          <a:spcPct val="150000"/>
+                        </a:lnSpc>
+                        <a:spcBef>
+                          <a:spcPts val="0"/>
+                        </a:spcBef>
+                        <a:spcAft>
+                          <a:spcPts val="0"/>
+                        </a:spcAft>
+                      </a:pPr>
+                      <a:r>
+                        <a:rPr lang="ru-RU" sz="1300">
+                          <a:effectLst/>
+                        </a:rPr>
+                        <a:t>+</a:t>
+                      </a:r>
+                      <a:endParaRPr lang="en-US" sz="1300">
+                        <a:effectLst/>
+                        <a:latin typeface="Times New Roman"/>
+                        <a:ea typeface="Times New Roman"/>
+                      </a:endParaRPr>
+                    </a:p>
+                  </a:txBody>
+                  <a:tcPr marL="30308" marR="30308" marT="0" marB="0"/>
+                </a:tc>
+              </a:tr>
+              <a:tr h="278741">
+                <a:tc vMerge="1">
+                  <a:txBody>
+                    <a:bodyPr/>
+                    <a:lstStyle/>
+                    <a:p>
+                      <a:endParaRPr lang="en-US"/>
+                    </a:p>
+                  </a:txBody>
+                  <a:tcPr/>
+                </a:tc>
+                <a:tc>
+                  <a:txBody>
+                    <a:bodyPr/>
+                    <a:lstStyle/>
+                    <a:p>
+                      <a:pPr marL="0" marR="0" indent="0" algn="just">
+                        <a:lnSpc>
+                          <a:spcPct val="150000"/>
+                        </a:lnSpc>
+                        <a:spcBef>
+                          <a:spcPts val="0"/>
+                        </a:spcBef>
+                        <a:spcAft>
+                          <a:spcPts val="0"/>
+                        </a:spcAft>
+                      </a:pPr>
+                      <a:r>
+                        <a:rPr lang="ru-RU" sz="1100">
+                          <a:effectLst/>
+                        </a:rPr>
+                        <a:t>Качка</a:t>
+                      </a:r>
+                      <a:endParaRPr lang="en-US" sz="1100">
+                        <a:effectLst/>
+                        <a:latin typeface="Times New Roman"/>
+                        <a:ea typeface="Times New Roman"/>
+                      </a:endParaRPr>
+                    </a:p>
+                  </a:txBody>
+                  <a:tcPr marL="30308" marR="30308" marT="0" marB="0"/>
+                </a:tc>
+                <a:tc>
+                  <a:txBody>
+                    <a:bodyPr/>
+                    <a:lstStyle/>
+                    <a:p>
+                      <a:pPr marL="0" marR="0" indent="0" algn="ctr">
+                        <a:lnSpc>
+                          <a:spcPct val="150000"/>
+                        </a:lnSpc>
+                        <a:spcBef>
+                          <a:spcPts val="0"/>
+                        </a:spcBef>
+                        <a:spcAft>
+                          <a:spcPts val="0"/>
+                        </a:spcAft>
+                      </a:pPr>
+                      <a:r>
+                        <a:rPr lang="ru-RU" sz="1300">
+                          <a:effectLst/>
+                        </a:rPr>
+                        <a:t>+</a:t>
+                      </a:r>
+                      <a:endParaRPr lang="en-US" sz="1300">
+                        <a:effectLst/>
+                        <a:latin typeface="Times New Roman"/>
+                        <a:ea typeface="Times New Roman"/>
+                      </a:endParaRPr>
+                    </a:p>
+                  </a:txBody>
+                  <a:tcPr marL="30308" marR="30308" marT="0" marB="0"/>
+                </a:tc>
+              </a:tr>
+              <a:tr h="278741">
+                <a:tc rowSpan="4">
+                  <a:txBody>
+                    <a:bodyPr/>
+                    <a:lstStyle/>
+                    <a:p>
+                      <a:pPr marL="0" marR="0" indent="0" algn="just">
+                        <a:lnSpc>
+                          <a:spcPct val="150000"/>
+                        </a:lnSpc>
+                        <a:spcBef>
+                          <a:spcPts val="0"/>
+                        </a:spcBef>
+                        <a:spcAft>
+                          <a:spcPts val="0"/>
+                        </a:spcAft>
+                      </a:pPr>
+                      <a:r>
+                        <a:rPr lang="ru-RU" sz="1300" dirty="0">
+                          <a:effectLst/>
+                        </a:rPr>
+                        <a:t>Инерциальная навигационная система</a:t>
+                      </a:r>
+                      <a:endParaRPr lang="en-US" sz="1300" dirty="0">
+                        <a:effectLst/>
+                        <a:latin typeface="Times New Roman"/>
+                        <a:ea typeface="Times New Roman"/>
+                      </a:endParaRPr>
+                    </a:p>
+                  </a:txBody>
+                  <a:tcPr marL="30308" marR="30308" marT="0" marB="0"/>
+                </a:tc>
+                <a:tc>
+                  <a:txBody>
+                    <a:bodyPr/>
+                    <a:lstStyle/>
+                    <a:p>
+                      <a:pPr marL="0" marR="0" indent="0" algn="just">
+                        <a:lnSpc>
+                          <a:spcPct val="150000"/>
+                        </a:lnSpc>
+                        <a:spcBef>
+                          <a:spcPts val="0"/>
+                        </a:spcBef>
+                        <a:spcAft>
+                          <a:spcPts val="0"/>
+                        </a:spcAft>
+                      </a:pPr>
+                      <a:r>
+                        <a:rPr lang="ru-RU" sz="1100">
+                          <a:effectLst/>
+                        </a:rPr>
+                        <a:t>Полярная ночь</a:t>
+                      </a:r>
+                      <a:endParaRPr lang="en-US" sz="1100">
+                        <a:effectLst/>
+                        <a:latin typeface="Times New Roman"/>
+                        <a:ea typeface="Times New Roman"/>
+                      </a:endParaRPr>
+                    </a:p>
+                  </a:txBody>
+                  <a:tcPr marL="30308" marR="30308" marT="0" marB="0"/>
+                </a:tc>
+                <a:tc>
+                  <a:txBody>
+                    <a:bodyPr/>
+                    <a:lstStyle/>
+                    <a:p>
+                      <a:pPr marL="0" marR="0" indent="0" algn="ctr">
+                        <a:lnSpc>
+                          <a:spcPct val="150000"/>
+                        </a:lnSpc>
+                        <a:spcBef>
+                          <a:spcPts val="0"/>
+                        </a:spcBef>
+                        <a:spcAft>
+                          <a:spcPts val="0"/>
+                        </a:spcAft>
+                      </a:pPr>
+                      <a:r>
+                        <a:rPr lang="ru-RU" sz="1300">
+                          <a:effectLst/>
+                        </a:rPr>
+                        <a:t>+</a:t>
+                      </a:r>
+                      <a:endParaRPr lang="en-US" sz="1300">
+                        <a:effectLst/>
+                        <a:latin typeface="Times New Roman"/>
+                        <a:ea typeface="Times New Roman"/>
+                      </a:endParaRPr>
+                    </a:p>
+                  </a:txBody>
+                  <a:tcPr marL="30308" marR="30308" marT="0" marB="0"/>
+                </a:tc>
+              </a:tr>
+              <a:tr h="278741">
+                <a:tc vMerge="1">
+                  <a:txBody>
+                    <a:bodyPr/>
+                    <a:lstStyle/>
+                    <a:p>
+                      <a:endParaRPr lang="en-US"/>
+                    </a:p>
+                  </a:txBody>
+                  <a:tcPr/>
+                </a:tc>
+                <a:tc>
+                  <a:txBody>
+                    <a:bodyPr/>
+                    <a:lstStyle/>
+                    <a:p>
+                      <a:pPr marL="0" marR="0" indent="0" algn="just">
+                        <a:lnSpc>
+                          <a:spcPct val="150000"/>
+                        </a:lnSpc>
+                        <a:spcBef>
+                          <a:spcPts val="0"/>
+                        </a:spcBef>
+                        <a:spcAft>
+                          <a:spcPts val="0"/>
+                        </a:spcAft>
+                      </a:pPr>
+                      <a:r>
+                        <a:rPr lang="ru-RU" sz="1100">
+                          <a:effectLst/>
+                        </a:rPr>
+                        <a:t>Метель</a:t>
+                      </a:r>
+                      <a:endParaRPr lang="en-US" sz="1100">
+                        <a:effectLst/>
+                        <a:latin typeface="Times New Roman"/>
+                        <a:ea typeface="Times New Roman"/>
+                      </a:endParaRPr>
+                    </a:p>
+                  </a:txBody>
+                  <a:tcPr marL="30308" marR="30308" marT="0" marB="0"/>
+                </a:tc>
+                <a:tc>
+                  <a:txBody>
+                    <a:bodyPr/>
+                    <a:lstStyle/>
+                    <a:p>
+                      <a:pPr marL="0" marR="0" indent="0" algn="ctr">
+                        <a:lnSpc>
+                          <a:spcPct val="150000"/>
+                        </a:lnSpc>
+                        <a:spcBef>
+                          <a:spcPts val="0"/>
+                        </a:spcBef>
+                        <a:spcAft>
+                          <a:spcPts val="0"/>
+                        </a:spcAft>
+                      </a:pPr>
+                      <a:r>
+                        <a:rPr lang="ru-RU" sz="1300">
+                          <a:effectLst/>
+                        </a:rPr>
+                        <a:t>+</a:t>
+                      </a:r>
+                      <a:endParaRPr lang="en-US" sz="1300">
+                        <a:effectLst/>
+                        <a:latin typeface="Times New Roman"/>
+                        <a:ea typeface="Times New Roman"/>
+                      </a:endParaRPr>
+                    </a:p>
+                  </a:txBody>
+                  <a:tcPr marL="30308" marR="30308" marT="0" marB="0"/>
+                </a:tc>
+              </a:tr>
+              <a:tr h="278741">
+                <a:tc vMerge="1">
+                  <a:txBody>
+                    <a:bodyPr/>
+                    <a:lstStyle/>
+                    <a:p>
+                      <a:endParaRPr lang="en-US"/>
+                    </a:p>
+                  </a:txBody>
+                  <a:tcPr/>
+                </a:tc>
+                <a:tc>
+                  <a:txBody>
+                    <a:bodyPr/>
+                    <a:lstStyle/>
+                    <a:p>
+                      <a:pPr marL="0" marR="0" indent="0" algn="just">
+                        <a:lnSpc>
+                          <a:spcPct val="150000"/>
+                        </a:lnSpc>
+                        <a:spcBef>
+                          <a:spcPts val="0"/>
+                        </a:spcBef>
+                        <a:spcAft>
+                          <a:spcPts val="0"/>
+                        </a:spcAft>
+                      </a:pPr>
+                      <a:r>
+                        <a:rPr lang="ru-RU" sz="1100">
+                          <a:effectLst/>
+                        </a:rPr>
+                        <a:t>Сильный ветер</a:t>
+                      </a:r>
+                      <a:endParaRPr lang="en-US" sz="1100">
+                        <a:effectLst/>
+                        <a:latin typeface="Times New Roman"/>
+                        <a:ea typeface="Times New Roman"/>
+                      </a:endParaRPr>
+                    </a:p>
+                  </a:txBody>
+                  <a:tcPr marL="30308" marR="30308" marT="0" marB="0"/>
+                </a:tc>
+                <a:tc>
+                  <a:txBody>
+                    <a:bodyPr/>
+                    <a:lstStyle/>
+                    <a:p>
+                      <a:pPr marL="0" marR="0" indent="0" algn="ctr">
+                        <a:lnSpc>
+                          <a:spcPct val="150000"/>
+                        </a:lnSpc>
+                        <a:spcBef>
+                          <a:spcPts val="0"/>
+                        </a:spcBef>
+                        <a:spcAft>
+                          <a:spcPts val="0"/>
+                        </a:spcAft>
+                      </a:pPr>
+                      <a:r>
+                        <a:rPr lang="ru-RU" sz="1300">
+                          <a:effectLst/>
+                        </a:rPr>
+                        <a:t>+</a:t>
+                      </a:r>
+                      <a:endParaRPr lang="en-US" sz="1300">
+                        <a:effectLst/>
+                        <a:latin typeface="Times New Roman"/>
+                        <a:ea typeface="Times New Roman"/>
+                      </a:endParaRPr>
+                    </a:p>
+                  </a:txBody>
+                  <a:tcPr marL="30308" marR="30308" marT="0" marB="0"/>
+                </a:tc>
+              </a:tr>
+              <a:tr h="278741">
+                <a:tc vMerge="1">
+                  <a:txBody>
+                    <a:bodyPr/>
+                    <a:lstStyle/>
+                    <a:p>
+                      <a:endParaRPr lang="en-US"/>
+                    </a:p>
+                  </a:txBody>
+                  <a:tcPr/>
+                </a:tc>
+                <a:tc>
+                  <a:txBody>
+                    <a:bodyPr/>
+                    <a:lstStyle/>
+                    <a:p>
+                      <a:pPr marL="0" marR="0" indent="0" algn="just">
+                        <a:lnSpc>
+                          <a:spcPct val="150000"/>
+                        </a:lnSpc>
+                        <a:spcBef>
+                          <a:spcPts val="0"/>
+                        </a:spcBef>
+                        <a:spcAft>
+                          <a:spcPts val="0"/>
+                        </a:spcAft>
+                      </a:pPr>
+                      <a:r>
+                        <a:rPr lang="ru-RU" sz="1100" dirty="0">
+                          <a:effectLst/>
+                        </a:rPr>
+                        <a:t>Качка</a:t>
+                      </a:r>
+                      <a:endParaRPr lang="en-US" sz="1100" dirty="0">
+                        <a:effectLst/>
+                        <a:latin typeface="Times New Roman"/>
+                        <a:ea typeface="Times New Roman"/>
+                      </a:endParaRPr>
+                    </a:p>
+                  </a:txBody>
+                  <a:tcPr marL="30308" marR="30308" marT="0" marB="0"/>
+                </a:tc>
+                <a:tc>
+                  <a:txBody>
+                    <a:bodyPr/>
+                    <a:lstStyle/>
+                    <a:p>
+                      <a:pPr marL="0" marR="0" indent="0" algn="ctr">
+                        <a:lnSpc>
+                          <a:spcPct val="150000"/>
+                        </a:lnSpc>
+                        <a:spcBef>
+                          <a:spcPts val="0"/>
+                        </a:spcBef>
+                        <a:spcAft>
+                          <a:spcPts val="0"/>
+                        </a:spcAft>
+                      </a:pPr>
+                      <a:r>
+                        <a:rPr lang="ru-RU" sz="1300" dirty="0">
+                          <a:effectLst/>
+                        </a:rPr>
+                        <a:t>-</a:t>
+                      </a:r>
+                      <a:endParaRPr lang="en-US" sz="1300" dirty="0">
+                        <a:effectLst/>
+                        <a:latin typeface="Times New Roman"/>
+                        <a:ea typeface="Times New Roman"/>
+                      </a:endParaRPr>
+                    </a:p>
+                  </a:txBody>
+                  <a:tcPr marL="30308" marR="30308" marT="0" marB="0"/>
+                </a:tc>
+              </a:tr>
+            </a:tbl>
+          </a:graphicData>
+        </a:graphic>
+      </p:graphicFrame>
       <p:sp>
         <p:nvSpPr>
-          <p:cNvPr id="3" name="TextBox 2"/>
+          <p:cNvPr id="11" name="TextBox 10"/>
           <p:cNvSpPr txBox="1"/>
           <p:nvPr/>
         </p:nvSpPr>
         <p:spPr>
           <a:xfrm>
-            <a:off x="266700" y="927100"/>
-            <a:ext cx="8623300" cy="5355312"/>
+            <a:off x="5797550" y="1014499"/>
+            <a:ext cx="3276600" cy="1877437"/>
           </a:xfrm>
           <a:prstGeom prst="rect">
             <a:avLst/>
@@ -4506,151 +6219,84 @@
           </a:bodyPr>
           <a:lstStyle/>
           <a:p>
-            <a:pPr marL="285750" indent="-285750" algn="just">
-              <a:buFontTx/>
-              <a:buChar char="-"/>
+            <a:pPr marL="800100" lvl="1" indent="-342900">
+              <a:buFont typeface="Arial" panose="020B0604020202020204" pitchFamily="34" charset="0"/>
+              <a:buChar char="•"/>
             </a:pPr>
             <a:r>
-              <a:rPr lang="ru-RU" sz="1800" dirty="0" smtClean="0"/>
-              <a:t>разработать набор сенсоров обеспечивающих непрерывную работоспособность комплекса датчиков; </a:t>
-            </a:r>
-          </a:p>
-          <a:p>
-            <a:pPr marL="285750" indent="-285750" algn="just">
-              <a:buFontTx/>
-              <a:buChar char="-"/>
+              <a:rPr lang="ru-RU" sz="1600" dirty="0"/>
+              <a:t>сильный ветер </a:t>
+            </a:r>
+          </a:p>
+          <a:p>
+            <a:pPr marL="800100" lvl="1" indent="-342900">
+              <a:buFont typeface="Arial" panose="020B0604020202020204" pitchFamily="34" charset="0"/>
+              <a:buChar char="•"/>
             </a:pPr>
-            <a:endParaRPr lang="ru-RU" sz="1800" dirty="0" smtClean="0"/>
-          </a:p>
-          <a:p>
-            <a:pPr marL="285750" indent="-285750" algn="just">
-              <a:buFontTx/>
-              <a:buChar char="-"/>
+            <a:r>
+              <a:rPr lang="ru-RU" sz="1600" dirty="0"/>
+              <a:t>низкие </a:t>
+            </a:r>
+            <a:r>
+              <a:rPr lang="ru-RU" sz="1600" dirty="0" smtClean="0"/>
+              <a:t>температуры</a:t>
+            </a:r>
+          </a:p>
+          <a:p>
+            <a:pPr marL="800100" lvl="1" indent="-342900">
+              <a:buFont typeface="Arial" panose="020B0604020202020204" pitchFamily="34" charset="0"/>
+              <a:buChar char="•"/>
             </a:pPr>
             <a:r>
-              <a:rPr lang="ru-RU" sz="1800" dirty="0" smtClean="0"/>
-              <a:t>разработать алгоритмы комплексирования данных сенсоров;</a:t>
-            </a:r>
-          </a:p>
-          <a:p>
-            <a:pPr marL="285750" indent="-285750" algn="just">
-              <a:buFontTx/>
-              <a:buChar char="-"/>
+              <a:rPr lang="ru-RU" sz="1600" dirty="0"/>
+              <a:t>метели </a:t>
+            </a:r>
+          </a:p>
+          <a:p>
+            <a:pPr marL="800100" lvl="1" indent="-342900">
+              <a:buFont typeface="Arial" panose="020B0604020202020204" pitchFamily="34" charset="0"/>
+              <a:buChar char="•"/>
             </a:pPr>
-            <a:endParaRPr lang="ru-RU" sz="1800" dirty="0" smtClean="0"/>
-          </a:p>
-          <a:p>
-            <a:pPr marL="285750" indent="-285750" algn="just">
-              <a:buFontTx/>
-              <a:buChar char="-"/>
+            <a:r>
+              <a:rPr lang="ru-RU" sz="1600" dirty="0"/>
+              <a:t>ледяные и снежные торосы</a:t>
+            </a:r>
+          </a:p>
+          <a:p>
+            <a:pPr marL="800100" lvl="1" indent="-342900">
+              <a:buFont typeface="Arial" panose="020B0604020202020204" pitchFamily="34" charset="0"/>
+              <a:buChar char="•"/>
             </a:pPr>
             <a:r>
-              <a:rPr lang="ru-RU" sz="1800" dirty="0"/>
-              <a:t>р</a:t>
-            </a:r>
-            <a:r>
-              <a:rPr lang="ru-RU" sz="1800" dirty="0" smtClean="0"/>
-              <a:t>азработать принципы обеспечения надежности системы на основе взаимозаменяемости датчиков;</a:t>
-            </a:r>
-          </a:p>
-          <a:p>
-            <a:pPr marL="285750" indent="-285750" algn="just">
-              <a:buFontTx/>
-              <a:buChar char="-"/>
-            </a:pPr>
-            <a:endParaRPr lang="ru-RU" sz="1800" dirty="0" smtClean="0"/>
-          </a:p>
-          <a:p>
-            <a:pPr marL="285750" indent="-285750" algn="just">
-              <a:buFontTx/>
-              <a:buChar char="-"/>
-            </a:pPr>
-            <a:r>
-              <a:rPr lang="ru-RU" sz="1800" dirty="0" smtClean="0"/>
-              <a:t>разработка критериев качества решения задачи навигации в сложных климатических условиях;</a:t>
-            </a:r>
-          </a:p>
-          <a:p>
-            <a:pPr marL="285750" indent="-285750" algn="just">
-              <a:buFontTx/>
-              <a:buChar char="-"/>
-            </a:pPr>
-            <a:endParaRPr lang="ru-RU" sz="1800" dirty="0" smtClean="0"/>
-          </a:p>
-          <a:p>
-            <a:pPr marL="285750" indent="-285750" algn="just">
-              <a:buFontTx/>
-              <a:buChar char="-"/>
-            </a:pPr>
-            <a:r>
-              <a:rPr lang="ru-RU" sz="1800" dirty="0"/>
-              <a:t>п</a:t>
-            </a:r>
-            <a:r>
-              <a:rPr lang="ru-RU" sz="1800" dirty="0" smtClean="0"/>
-              <a:t>роверить в вычислительных экспериментах разработанные алгоритмы комплексирования;</a:t>
-            </a:r>
-          </a:p>
-          <a:p>
-            <a:pPr marL="285750" indent="-285750" algn="just">
-              <a:buFontTx/>
-              <a:buChar char="-"/>
-            </a:pPr>
-            <a:endParaRPr lang="ru-RU" sz="1800" dirty="0" smtClean="0"/>
-          </a:p>
-          <a:p>
-            <a:pPr marL="285750" indent="-285750" algn="just">
-              <a:buFontTx/>
-              <a:buChar char="-"/>
-            </a:pPr>
-            <a:r>
-              <a:rPr lang="ru-RU" sz="1800" dirty="0"/>
-              <a:t>п</a:t>
-            </a:r>
-            <a:r>
-              <a:rPr lang="ru-RU" sz="1800" dirty="0" smtClean="0"/>
-              <a:t>роверить в вычислительных экспериментах разработанные алгоритмы навигации мобильного робота с учетом сложных климатических условий;</a:t>
-            </a:r>
-          </a:p>
-          <a:p>
-            <a:pPr marL="285750" indent="-285750" algn="just">
-              <a:buFontTx/>
-              <a:buChar char="-"/>
-            </a:pPr>
-            <a:endParaRPr lang="ru-RU" sz="1800" dirty="0" smtClean="0"/>
-          </a:p>
-          <a:p>
-            <a:pPr marL="285750" indent="-285750" algn="just">
-              <a:buFontTx/>
-              <a:buChar char="-"/>
-            </a:pPr>
-            <a:r>
-              <a:rPr lang="ru-RU" sz="1800" dirty="0"/>
-              <a:t>р</a:t>
-            </a:r>
-            <a:r>
-              <a:rPr lang="ru-RU" sz="1800" dirty="0" smtClean="0"/>
-              <a:t>азработать алгоритмы учета влияния климатических условий на работоспособность датчиков робота.</a:t>
-            </a:r>
-            <a:endParaRPr lang="ru-RU" sz="1800" dirty="0"/>
+              <a:rPr lang="ru-RU" sz="1600" dirty="0"/>
+              <a:t>полярная </a:t>
+            </a:r>
+            <a:r>
+              <a:rPr lang="ru-RU" sz="1600" dirty="0" smtClean="0"/>
+              <a:t>ночь</a:t>
+            </a:r>
+            <a:endParaRPr lang="ru-RU" sz="1600" dirty="0"/>
+          </a:p>
+          <a:p>
+            <a:endParaRPr lang="en-US" dirty="0"/>
           </a:p>
         </p:txBody>
       </p:sp>
     </p:spTree>
     <p:extLst>
       <p:ext uri="{BB962C8B-B14F-4D97-AF65-F5344CB8AC3E}">
-        <p14:creationId xmlns:p14="http://schemas.microsoft.com/office/powerpoint/2010/main" val="1430426045"/>
+        <p14:creationId xmlns:p14="http://schemas.microsoft.com/office/powerpoint/2010/main" val="2536239404"/>
       </p:ext>
     </p:extLst>
   </p:cSld>
   <p:clrMapOvr>
     <a:masterClrMapping/>
   </p:clrMapOvr>
-  <mc:AlternateContent xmlns:mc="http://schemas.openxmlformats.org/markup-compatibility/2006" xmlns:p14="http://schemas.microsoft.com/office/powerpoint/2010/main">
-    <mc:Choice Requires="p14">
-      <p:transition p14:dur="0"/>
+  <mc:AlternateContent xmlns:mc="http://schemas.openxmlformats.org/markup-compatibility/2006">
+    <mc:Choice xmlns:p14="http://schemas.microsoft.com/office/powerpoint/2010/main" Requires="p14">
+      <p:transition p14:dur="10"/>
     </mc:Choice>
-    <mc:Fallback xmlns="">
+    <mc:Fallback>
       <p:transition/>
     </mc:Fallback>
   </mc:AlternateContent>
@@ -4699,1735 +6345,22 @@
             <a:pPr algn="ctr"/>
             <a:r>
               <a:rPr lang="ru-RU" dirty="0" smtClean="0"/>
-              <a:t>Сложные климатические условия</a:t>
+              <a:t>Преимущества группового управления</a:t>
             </a:r>
             <a:endParaRPr lang="ru-RU" dirty="0"/>
           </a:p>
         </p:txBody>
       </p:sp>
-      <p:graphicFrame>
-        <p:nvGraphicFramePr>
-          <p:cNvPr id="9" name="Таблица 8"/>
-          <p:cNvGraphicFramePr>
-            <a:graphicFrameLocks noGrp="1"/>
-          </p:cNvGraphicFramePr>
-          <p:nvPr>
-            <p:extLst>
-              <p:ext uri="{D42A27DB-BD31-4B8C-83A1-F6EECF244321}">
-                <p14:modId xmlns:p14="http://schemas.microsoft.com/office/powerpoint/2010/main" val="3533023341"/>
-              </p:ext>
-            </p:extLst>
-          </p:nvPr>
-        </p:nvGraphicFramePr>
-        <p:xfrm>
-          <a:off x="152401" y="902844"/>
-          <a:ext cx="6083805" cy="6240780"/>
-        </p:xfrm>
-        <a:graphic>
-          <a:graphicData uri="http://schemas.openxmlformats.org/drawingml/2006/table">
-            <a:tbl>
-              <a:tblPr firstRow="1" firstCol="1" bandRow="1">
-                <a:tableStyleId>{5C22544A-7EE6-4342-B048-85BDC9FD1C3A}</a:tableStyleId>
-              </a:tblPr>
-              <a:tblGrid>
-                <a:gridCol w="3037496"/>
-                <a:gridCol w="1477619"/>
-                <a:gridCol w="1568690"/>
-              </a:tblGrid>
-              <a:tr h="283579">
-                <a:tc>
-                  <a:txBody>
-                    <a:bodyPr/>
-                    <a:lstStyle/>
-                    <a:p>
-                      <a:pPr marL="0" marR="0" indent="0" algn="just">
-                        <a:lnSpc>
-                          <a:spcPct val="150000"/>
-                        </a:lnSpc>
-                        <a:spcBef>
-                          <a:spcPts val="0"/>
-                        </a:spcBef>
-                        <a:spcAft>
-                          <a:spcPts val="0"/>
-                        </a:spcAft>
-                      </a:pPr>
-                      <a:r>
-                        <a:rPr lang="ru-RU" sz="1300" dirty="0">
-                          <a:effectLst/>
-                        </a:rPr>
-                        <a:t>Датчик</a:t>
-                      </a:r>
-                      <a:endParaRPr lang="en-US" sz="1300" dirty="0">
-                        <a:effectLst/>
-                        <a:latin typeface="Times New Roman"/>
-                        <a:ea typeface="Times New Roman"/>
-                      </a:endParaRPr>
-                    </a:p>
-                  </a:txBody>
-                  <a:tcPr marL="30308" marR="30308" marT="0" marB="0"/>
-                </a:tc>
-                <a:tc>
-                  <a:txBody>
-                    <a:bodyPr/>
-                    <a:lstStyle/>
-                    <a:p>
-                      <a:pPr marL="0" marR="0" indent="0" algn="just">
-                        <a:lnSpc>
-                          <a:spcPct val="150000"/>
-                        </a:lnSpc>
-                        <a:spcBef>
-                          <a:spcPts val="0"/>
-                        </a:spcBef>
-                        <a:spcAft>
-                          <a:spcPts val="0"/>
-                        </a:spcAft>
-                      </a:pPr>
-                      <a:r>
-                        <a:rPr lang="ru-RU" sz="1300" dirty="0">
-                          <a:effectLst/>
-                        </a:rPr>
-                        <a:t>Погодные условия</a:t>
-                      </a:r>
-                      <a:endParaRPr lang="en-US" sz="1300" dirty="0">
-                        <a:effectLst/>
-                        <a:latin typeface="Times New Roman"/>
-                        <a:ea typeface="Times New Roman"/>
-                      </a:endParaRPr>
-                    </a:p>
-                  </a:txBody>
-                  <a:tcPr marL="30308" marR="30308" marT="0" marB="0"/>
-                </a:tc>
-                <a:tc>
-                  <a:txBody>
-                    <a:bodyPr/>
-                    <a:lstStyle/>
-                    <a:p>
-                      <a:pPr marL="0" marR="0" indent="0" algn="just">
-                        <a:lnSpc>
-                          <a:spcPct val="150000"/>
-                        </a:lnSpc>
-                        <a:spcBef>
-                          <a:spcPts val="0"/>
-                        </a:spcBef>
-                        <a:spcAft>
-                          <a:spcPts val="0"/>
-                        </a:spcAft>
-                      </a:pPr>
-                      <a:r>
-                        <a:rPr lang="ru-RU" sz="1300">
-                          <a:effectLst/>
-                        </a:rPr>
-                        <a:t>Применимость</a:t>
-                      </a:r>
-                      <a:endParaRPr lang="en-US" sz="1300">
-                        <a:effectLst/>
-                        <a:latin typeface="Times New Roman"/>
-                        <a:ea typeface="Times New Roman"/>
-                      </a:endParaRPr>
-                    </a:p>
-                  </a:txBody>
-                  <a:tcPr marL="30308" marR="30308" marT="0" marB="0"/>
-                </a:tc>
-              </a:tr>
-              <a:tr h="283579">
-                <a:tc rowSpan="4">
-                  <a:txBody>
-                    <a:bodyPr/>
-                    <a:lstStyle/>
-                    <a:p>
-                      <a:pPr marL="0" marR="0" indent="0" algn="just">
-                        <a:lnSpc>
-                          <a:spcPct val="150000"/>
-                        </a:lnSpc>
-                        <a:spcBef>
-                          <a:spcPts val="0"/>
-                        </a:spcBef>
-                        <a:spcAft>
-                          <a:spcPts val="0"/>
-                        </a:spcAft>
-                      </a:pPr>
-                      <a:r>
-                        <a:rPr lang="ru-RU" sz="1300" dirty="0">
-                          <a:effectLst/>
-                        </a:rPr>
-                        <a:t>Видеокамеры</a:t>
-                      </a:r>
-                      <a:endParaRPr lang="en-US" sz="1300" dirty="0">
-                        <a:effectLst/>
-                        <a:latin typeface="Times New Roman"/>
-                        <a:ea typeface="Times New Roman"/>
-                      </a:endParaRPr>
-                    </a:p>
-                  </a:txBody>
-                  <a:tcPr marL="30308" marR="30308" marT="0" marB="0"/>
-                </a:tc>
-                <a:tc>
-                  <a:txBody>
-                    <a:bodyPr/>
-                    <a:lstStyle/>
-                    <a:p>
-                      <a:pPr marL="0" marR="0" indent="0" algn="just">
-                        <a:lnSpc>
-                          <a:spcPct val="150000"/>
-                        </a:lnSpc>
-                        <a:spcBef>
-                          <a:spcPts val="0"/>
-                        </a:spcBef>
-                        <a:spcAft>
-                          <a:spcPts val="0"/>
-                        </a:spcAft>
-                      </a:pPr>
-                      <a:r>
-                        <a:rPr lang="ru-RU" sz="1300">
-                          <a:effectLst/>
-                        </a:rPr>
-                        <a:t>Полярная ночь</a:t>
-                      </a:r>
-                      <a:endParaRPr lang="en-US" sz="1300">
-                        <a:effectLst/>
-                        <a:latin typeface="Times New Roman"/>
-                        <a:ea typeface="Times New Roman"/>
-                      </a:endParaRPr>
-                    </a:p>
-                  </a:txBody>
-                  <a:tcPr marL="30308" marR="30308" marT="0" marB="0"/>
-                </a:tc>
-                <a:tc>
-                  <a:txBody>
-                    <a:bodyPr/>
-                    <a:lstStyle/>
-                    <a:p>
-                      <a:pPr marL="0" marR="0" indent="0" algn="ctr">
-                        <a:lnSpc>
-                          <a:spcPct val="150000"/>
-                        </a:lnSpc>
-                        <a:spcBef>
-                          <a:spcPts val="0"/>
-                        </a:spcBef>
-                        <a:spcAft>
-                          <a:spcPts val="0"/>
-                        </a:spcAft>
-                      </a:pPr>
-                      <a:r>
-                        <a:rPr lang="ru-RU" sz="1300">
-                          <a:effectLst/>
-                        </a:rPr>
-                        <a:t>-</a:t>
-                      </a:r>
-                      <a:endParaRPr lang="en-US" sz="1300">
-                        <a:effectLst/>
-                        <a:latin typeface="Times New Roman"/>
-                        <a:ea typeface="Times New Roman"/>
-                      </a:endParaRPr>
-                    </a:p>
-                  </a:txBody>
-                  <a:tcPr marL="30308" marR="30308" marT="0" marB="0"/>
-                </a:tc>
-              </a:tr>
-              <a:tr h="283579">
-                <a:tc vMerge="1">
-                  <a:txBody>
-                    <a:bodyPr/>
-                    <a:lstStyle/>
-                    <a:p>
-                      <a:endParaRPr lang="en-US"/>
-                    </a:p>
-                  </a:txBody>
-                  <a:tcPr/>
-                </a:tc>
-                <a:tc>
-                  <a:txBody>
-                    <a:bodyPr/>
-                    <a:lstStyle/>
-                    <a:p>
-                      <a:pPr marL="0" marR="0" indent="0" algn="just">
-                        <a:lnSpc>
-                          <a:spcPct val="150000"/>
-                        </a:lnSpc>
-                        <a:spcBef>
-                          <a:spcPts val="0"/>
-                        </a:spcBef>
-                        <a:spcAft>
-                          <a:spcPts val="0"/>
-                        </a:spcAft>
-                      </a:pPr>
-                      <a:r>
-                        <a:rPr lang="ru-RU" sz="1300">
-                          <a:effectLst/>
-                        </a:rPr>
-                        <a:t>Метель</a:t>
-                      </a:r>
-                      <a:endParaRPr lang="en-US" sz="1300">
-                        <a:effectLst/>
-                        <a:latin typeface="Times New Roman"/>
-                        <a:ea typeface="Times New Roman"/>
-                      </a:endParaRPr>
-                    </a:p>
-                  </a:txBody>
-                  <a:tcPr marL="30308" marR="30308" marT="0" marB="0"/>
-                </a:tc>
-                <a:tc>
-                  <a:txBody>
-                    <a:bodyPr/>
-                    <a:lstStyle/>
-                    <a:p>
-                      <a:pPr marL="0" marR="0" indent="0" algn="ctr">
-                        <a:lnSpc>
-                          <a:spcPct val="150000"/>
-                        </a:lnSpc>
-                        <a:spcBef>
-                          <a:spcPts val="0"/>
-                        </a:spcBef>
-                        <a:spcAft>
-                          <a:spcPts val="0"/>
-                        </a:spcAft>
-                      </a:pPr>
-                      <a:r>
-                        <a:rPr lang="ru-RU" sz="1300">
-                          <a:effectLst/>
-                        </a:rPr>
-                        <a:t>-</a:t>
-                      </a:r>
-                      <a:endParaRPr lang="en-US" sz="1300">
-                        <a:effectLst/>
-                        <a:latin typeface="Times New Roman"/>
-                        <a:ea typeface="Times New Roman"/>
-                      </a:endParaRPr>
-                    </a:p>
-                  </a:txBody>
-                  <a:tcPr marL="30308" marR="30308" marT="0" marB="0"/>
-                </a:tc>
-              </a:tr>
-              <a:tr h="283579">
-                <a:tc vMerge="1">
-                  <a:txBody>
-                    <a:bodyPr/>
-                    <a:lstStyle/>
-                    <a:p>
-                      <a:endParaRPr lang="en-US"/>
-                    </a:p>
-                  </a:txBody>
-                  <a:tcPr/>
-                </a:tc>
-                <a:tc>
-                  <a:txBody>
-                    <a:bodyPr/>
-                    <a:lstStyle/>
-                    <a:p>
-                      <a:pPr marL="0" marR="0" indent="0" algn="just">
-                        <a:lnSpc>
-                          <a:spcPct val="150000"/>
-                        </a:lnSpc>
-                        <a:spcBef>
-                          <a:spcPts val="0"/>
-                        </a:spcBef>
-                        <a:spcAft>
-                          <a:spcPts val="0"/>
-                        </a:spcAft>
-                      </a:pPr>
-                      <a:r>
-                        <a:rPr lang="ru-RU" sz="1300">
-                          <a:effectLst/>
-                        </a:rPr>
-                        <a:t>Сильный ветер</a:t>
-                      </a:r>
-                      <a:endParaRPr lang="en-US" sz="1300">
-                        <a:effectLst/>
-                        <a:latin typeface="Times New Roman"/>
-                        <a:ea typeface="Times New Roman"/>
-                      </a:endParaRPr>
-                    </a:p>
-                  </a:txBody>
-                  <a:tcPr marL="30308" marR="30308" marT="0" marB="0"/>
-                </a:tc>
-                <a:tc>
-                  <a:txBody>
-                    <a:bodyPr/>
-                    <a:lstStyle/>
-                    <a:p>
-                      <a:pPr marL="0" marR="0" indent="0" algn="ctr">
-                        <a:lnSpc>
-                          <a:spcPct val="150000"/>
-                        </a:lnSpc>
-                        <a:spcBef>
-                          <a:spcPts val="0"/>
-                        </a:spcBef>
-                        <a:spcAft>
-                          <a:spcPts val="0"/>
-                        </a:spcAft>
-                      </a:pPr>
-                      <a:r>
-                        <a:rPr lang="ru-RU" sz="1300">
-                          <a:effectLst/>
-                        </a:rPr>
-                        <a:t>+</a:t>
-                      </a:r>
-                      <a:endParaRPr lang="en-US" sz="1300">
-                        <a:effectLst/>
-                        <a:latin typeface="Times New Roman"/>
-                        <a:ea typeface="Times New Roman"/>
-                      </a:endParaRPr>
-                    </a:p>
-                  </a:txBody>
-                  <a:tcPr marL="30308" marR="30308" marT="0" marB="0"/>
-                </a:tc>
-              </a:tr>
-              <a:tr h="283579">
-                <a:tc vMerge="1">
-                  <a:txBody>
-                    <a:bodyPr/>
-                    <a:lstStyle/>
-                    <a:p>
-                      <a:endParaRPr lang="en-US"/>
-                    </a:p>
-                  </a:txBody>
-                  <a:tcPr/>
-                </a:tc>
-                <a:tc>
-                  <a:txBody>
-                    <a:bodyPr/>
-                    <a:lstStyle/>
-                    <a:p>
-                      <a:pPr marL="0" marR="0" indent="0" algn="just">
-                        <a:lnSpc>
-                          <a:spcPct val="150000"/>
-                        </a:lnSpc>
-                        <a:spcBef>
-                          <a:spcPts val="0"/>
-                        </a:spcBef>
-                        <a:spcAft>
-                          <a:spcPts val="0"/>
-                        </a:spcAft>
-                      </a:pPr>
-                      <a:r>
-                        <a:rPr lang="ru-RU" sz="1300">
-                          <a:effectLst/>
-                        </a:rPr>
-                        <a:t>Качка</a:t>
-                      </a:r>
-                      <a:endParaRPr lang="en-US" sz="1300">
-                        <a:effectLst/>
-                        <a:latin typeface="Times New Roman"/>
-                        <a:ea typeface="Times New Roman"/>
-                      </a:endParaRPr>
-                    </a:p>
-                  </a:txBody>
-                  <a:tcPr marL="30308" marR="30308" marT="0" marB="0"/>
-                </a:tc>
-                <a:tc>
-                  <a:txBody>
-                    <a:bodyPr/>
-                    <a:lstStyle/>
-                    <a:p>
-                      <a:pPr marL="0" marR="0" indent="0" algn="ctr">
-                        <a:lnSpc>
-                          <a:spcPct val="150000"/>
-                        </a:lnSpc>
-                        <a:spcBef>
-                          <a:spcPts val="0"/>
-                        </a:spcBef>
-                        <a:spcAft>
-                          <a:spcPts val="0"/>
-                        </a:spcAft>
-                      </a:pPr>
-                      <a:r>
-                        <a:rPr lang="ru-RU" sz="1300">
-                          <a:effectLst/>
-                        </a:rPr>
-                        <a:t>+</a:t>
-                      </a:r>
-                      <a:endParaRPr lang="en-US" sz="1300">
-                        <a:effectLst/>
-                        <a:latin typeface="Times New Roman"/>
-                        <a:ea typeface="Times New Roman"/>
-                      </a:endParaRPr>
-                    </a:p>
-                  </a:txBody>
-                  <a:tcPr marL="30308" marR="30308" marT="0" marB="0"/>
-                </a:tc>
-              </a:tr>
-              <a:tr h="283579">
-                <a:tc rowSpan="4">
-                  <a:txBody>
-                    <a:bodyPr/>
-                    <a:lstStyle/>
-                    <a:p>
-                      <a:pPr marL="0" marR="0" indent="0" algn="just">
-                        <a:lnSpc>
-                          <a:spcPct val="150000"/>
-                        </a:lnSpc>
-                        <a:spcBef>
-                          <a:spcPts val="0"/>
-                        </a:spcBef>
-                        <a:spcAft>
-                          <a:spcPts val="0"/>
-                        </a:spcAft>
-                      </a:pPr>
-                      <a:r>
-                        <a:rPr lang="ru-RU" sz="1300" dirty="0">
-                          <a:effectLst/>
-                        </a:rPr>
-                        <a:t>Ультразвуковой дальномер </a:t>
-                      </a:r>
-                      <a:endParaRPr lang="en-US" sz="1300" dirty="0">
-                        <a:effectLst/>
-                        <a:latin typeface="Times New Roman"/>
-                        <a:ea typeface="Times New Roman"/>
-                      </a:endParaRPr>
-                    </a:p>
-                  </a:txBody>
-                  <a:tcPr marL="30308" marR="30308" marT="0" marB="0"/>
-                </a:tc>
-                <a:tc>
-                  <a:txBody>
-                    <a:bodyPr/>
-                    <a:lstStyle/>
-                    <a:p>
-                      <a:pPr marL="0" marR="0" indent="0" algn="just">
-                        <a:lnSpc>
-                          <a:spcPct val="150000"/>
-                        </a:lnSpc>
-                        <a:spcBef>
-                          <a:spcPts val="0"/>
-                        </a:spcBef>
-                        <a:spcAft>
-                          <a:spcPts val="0"/>
-                        </a:spcAft>
-                      </a:pPr>
-                      <a:r>
-                        <a:rPr lang="ru-RU" sz="1300">
-                          <a:effectLst/>
-                        </a:rPr>
-                        <a:t>Полярная ночь</a:t>
-                      </a:r>
-                      <a:endParaRPr lang="en-US" sz="1300">
-                        <a:effectLst/>
-                        <a:latin typeface="Times New Roman"/>
-                        <a:ea typeface="Times New Roman"/>
-                      </a:endParaRPr>
-                    </a:p>
-                  </a:txBody>
-                  <a:tcPr marL="30308" marR="30308" marT="0" marB="0"/>
-                </a:tc>
-                <a:tc>
-                  <a:txBody>
-                    <a:bodyPr/>
-                    <a:lstStyle/>
-                    <a:p>
-                      <a:pPr marL="0" marR="0" indent="0" algn="ctr">
-                        <a:lnSpc>
-                          <a:spcPct val="150000"/>
-                        </a:lnSpc>
-                        <a:spcBef>
-                          <a:spcPts val="0"/>
-                        </a:spcBef>
-                        <a:spcAft>
-                          <a:spcPts val="0"/>
-                        </a:spcAft>
-                      </a:pPr>
-                      <a:r>
-                        <a:rPr lang="ru-RU" sz="1300">
-                          <a:effectLst/>
-                        </a:rPr>
-                        <a:t>+</a:t>
-                      </a:r>
-                      <a:endParaRPr lang="en-US" sz="1300">
-                        <a:effectLst/>
-                        <a:latin typeface="Times New Roman"/>
-                        <a:ea typeface="Times New Roman"/>
-                      </a:endParaRPr>
-                    </a:p>
-                  </a:txBody>
-                  <a:tcPr marL="30308" marR="30308" marT="0" marB="0"/>
-                </a:tc>
-              </a:tr>
-              <a:tr h="283579">
-                <a:tc vMerge="1">
-                  <a:txBody>
-                    <a:bodyPr/>
-                    <a:lstStyle/>
-                    <a:p>
-                      <a:endParaRPr lang="en-US"/>
-                    </a:p>
-                  </a:txBody>
-                  <a:tcPr/>
-                </a:tc>
-                <a:tc>
-                  <a:txBody>
-                    <a:bodyPr/>
-                    <a:lstStyle/>
-                    <a:p>
-                      <a:pPr marL="0" marR="0" indent="0" algn="just">
-                        <a:lnSpc>
-                          <a:spcPct val="150000"/>
-                        </a:lnSpc>
-                        <a:spcBef>
-                          <a:spcPts val="0"/>
-                        </a:spcBef>
-                        <a:spcAft>
-                          <a:spcPts val="0"/>
-                        </a:spcAft>
-                      </a:pPr>
-                      <a:r>
-                        <a:rPr lang="ru-RU" sz="1300" dirty="0">
-                          <a:effectLst/>
-                        </a:rPr>
-                        <a:t>Метель</a:t>
-                      </a:r>
-                      <a:endParaRPr lang="en-US" sz="1300" dirty="0">
-                        <a:effectLst/>
-                        <a:latin typeface="Times New Roman"/>
-                        <a:ea typeface="Times New Roman"/>
-                      </a:endParaRPr>
-                    </a:p>
-                  </a:txBody>
-                  <a:tcPr marL="30308" marR="30308" marT="0" marB="0"/>
-                </a:tc>
-                <a:tc>
-                  <a:txBody>
-                    <a:bodyPr/>
-                    <a:lstStyle/>
-                    <a:p>
-                      <a:pPr marL="0" marR="0" indent="0" algn="ctr">
-                        <a:lnSpc>
-                          <a:spcPct val="150000"/>
-                        </a:lnSpc>
-                        <a:spcBef>
-                          <a:spcPts val="0"/>
-                        </a:spcBef>
-                        <a:spcAft>
-                          <a:spcPts val="0"/>
-                        </a:spcAft>
-                      </a:pPr>
-                      <a:r>
-                        <a:rPr lang="ru-RU" sz="1300">
-                          <a:effectLst/>
-                        </a:rPr>
-                        <a:t>-</a:t>
-                      </a:r>
-                      <a:endParaRPr lang="en-US" sz="1300">
-                        <a:effectLst/>
-                        <a:latin typeface="Times New Roman"/>
-                        <a:ea typeface="Times New Roman"/>
-                      </a:endParaRPr>
-                    </a:p>
-                  </a:txBody>
-                  <a:tcPr marL="30308" marR="30308" marT="0" marB="0"/>
-                </a:tc>
-              </a:tr>
-              <a:tr h="283579">
-                <a:tc vMerge="1">
-                  <a:txBody>
-                    <a:bodyPr/>
-                    <a:lstStyle/>
-                    <a:p>
-                      <a:endParaRPr lang="en-US"/>
-                    </a:p>
-                  </a:txBody>
-                  <a:tcPr/>
-                </a:tc>
-                <a:tc>
-                  <a:txBody>
-                    <a:bodyPr/>
-                    <a:lstStyle/>
-                    <a:p>
-                      <a:pPr marL="0" marR="0" indent="0" algn="just">
-                        <a:lnSpc>
-                          <a:spcPct val="150000"/>
-                        </a:lnSpc>
-                        <a:spcBef>
-                          <a:spcPts val="0"/>
-                        </a:spcBef>
-                        <a:spcAft>
-                          <a:spcPts val="0"/>
-                        </a:spcAft>
-                      </a:pPr>
-                      <a:r>
-                        <a:rPr lang="ru-RU" sz="1300">
-                          <a:effectLst/>
-                        </a:rPr>
-                        <a:t>Сильный ветер</a:t>
-                      </a:r>
-                      <a:endParaRPr lang="en-US" sz="1300">
-                        <a:effectLst/>
-                        <a:latin typeface="Times New Roman"/>
-                        <a:ea typeface="Times New Roman"/>
-                      </a:endParaRPr>
-                    </a:p>
-                  </a:txBody>
-                  <a:tcPr marL="30308" marR="30308" marT="0" marB="0"/>
-                </a:tc>
-                <a:tc>
-                  <a:txBody>
-                    <a:bodyPr/>
-                    <a:lstStyle/>
-                    <a:p>
-                      <a:pPr marL="0" marR="0" indent="0" algn="ctr">
-                        <a:lnSpc>
-                          <a:spcPct val="150000"/>
-                        </a:lnSpc>
-                        <a:spcBef>
-                          <a:spcPts val="0"/>
-                        </a:spcBef>
-                        <a:spcAft>
-                          <a:spcPts val="0"/>
-                        </a:spcAft>
-                      </a:pPr>
-                      <a:r>
-                        <a:rPr lang="ru-RU" sz="1300">
-                          <a:effectLst/>
-                        </a:rPr>
-                        <a:t>-</a:t>
-                      </a:r>
-                      <a:endParaRPr lang="en-US" sz="1300">
-                        <a:effectLst/>
-                        <a:latin typeface="Times New Roman"/>
-                        <a:ea typeface="Times New Roman"/>
-                      </a:endParaRPr>
-                    </a:p>
-                  </a:txBody>
-                  <a:tcPr marL="30308" marR="30308" marT="0" marB="0"/>
-                </a:tc>
-              </a:tr>
-              <a:tr h="283579">
-                <a:tc vMerge="1">
-                  <a:txBody>
-                    <a:bodyPr/>
-                    <a:lstStyle/>
-                    <a:p>
-                      <a:endParaRPr lang="en-US"/>
-                    </a:p>
-                  </a:txBody>
-                  <a:tcPr/>
-                </a:tc>
-                <a:tc>
-                  <a:txBody>
-                    <a:bodyPr/>
-                    <a:lstStyle/>
-                    <a:p>
-                      <a:pPr marL="0" marR="0" indent="0" algn="just">
-                        <a:lnSpc>
-                          <a:spcPct val="150000"/>
-                        </a:lnSpc>
-                        <a:spcBef>
-                          <a:spcPts val="0"/>
-                        </a:spcBef>
-                        <a:spcAft>
-                          <a:spcPts val="0"/>
-                        </a:spcAft>
-                      </a:pPr>
-                      <a:r>
-                        <a:rPr lang="ru-RU" sz="1300">
-                          <a:effectLst/>
-                        </a:rPr>
-                        <a:t>Качка</a:t>
-                      </a:r>
-                      <a:endParaRPr lang="en-US" sz="1300">
-                        <a:effectLst/>
-                        <a:latin typeface="Times New Roman"/>
-                        <a:ea typeface="Times New Roman"/>
-                      </a:endParaRPr>
-                    </a:p>
-                  </a:txBody>
-                  <a:tcPr marL="30308" marR="30308" marT="0" marB="0"/>
-                </a:tc>
-                <a:tc>
-                  <a:txBody>
-                    <a:bodyPr/>
-                    <a:lstStyle/>
-                    <a:p>
-                      <a:pPr marL="0" marR="0" indent="0" algn="ctr">
-                        <a:lnSpc>
-                          <a:spcPct val="150000"/>
-                        </a:lnSpc>
-                        <a:spcBef>
-                          <a:spcPts val="0"/>
-                        </a:spcBef>
-                        <a:spcAft>
-                          <a:spcPts val="0"/>
-                        </a:spcAft>
-                      </a:pPr>
-                      <a:r>
-                        <a:rPr lang="ru-RU" sz="1300">
-                          <a:effectLst/>
-                        </a:rPr>
-                        <a:t>+</a:t>
-                      </a:r>
-                      <a:endParaRPr lang="en-US" sz="1300">
-                        <a:effectLst/>
-                        <a:latin typeface="Times New Roman"/>
-                        <a:ea typeface="Times New Roman"/>
-                      </a:endParaRPr>
-                    </a:p>
-                  </a:txBody>
-                  <a:tcPr marL="30308" marR="30308" marT="0" marB="0"/>
-                </a:tc>
-              </a:tr>
-              <a:tr h="283579">
-                <a:tc rowSpan="4">
-                  <a:txBody>
-                    <a:bodyPr/>
-                    <a:lstStyle/>
-                    <a:p>
-                      <a:pPr marL="0" marR="0" indent="0" algn="just">
-                        <a:lnSpc>
-                          <a:spcPct val="150000"/>
-                        </a:lnSpc>
-                        <a:spcBef>
-                          <a:spcPts val="0"/>
-                        </a:spcBef>
-                        <a:spcAft>
-                          <a:spcPts val="0"/>
-                        </a:spcAft>
-                      </a:pPr>
-                      <a:r>
-                        <a:rPr lang="ru-RU" sz="1300">
-                          <a:effectLst/>
-                        </a:rPr>
-                        <a:t>Лазерный дальномер</a:t>
-                      </a:r>
-                      <a:endParaRPr lang="en-US" sz="1300">
-                        <a:effectLst/>
-                        <a:latin typeface="Times New Roman"/>
-                        <a:ea typeface="Times New Roman"/>
-                      </a:endParaRPr>
-                    </a:p>
-                  </a:txBody>
-                  <a:tcPr marL="30308" marR="30308" marT="0" marB="0"/>
-                </a:tc>
-                <a:tc>
-                  <a:txBody>
-                    <a:bodyPr/>
-                    <a:lstStyle/>
-                    <a:p>
-                      <a:pPr marL="0" marR="0" indent="0" algn="just">
-                        <a:lnSpc>
-                          <a:spcPct val="150000"/>
-                        </a:lnSpc>
-                        <a:spcBef>
-                          <a:spcPts val="0"/>
-                        </a:spcBef>
-                        <a:spcAft>
-                          <a:spcPts val="0"/>
-                        </a:spcAft>
-                      </a:pPr>
-                      <a:r>
-                        <a:rPr lang="ru-RU" sz="1300">
-                          <a:effectLst/>
-                        </a:rPr>
-                        <a:t>Полярная ночь</a:t>
-                      </a:r>
-                      <a:endParaRPr lang="en-US" sz="1300">
-                        <a:effectLst/>
-                        <a:latin typeface="Times New Roman"/>
-                        <a:ea typeface="Times New Roman"/>
-                      </a:endParaRPr>
-                    </a:p>
-                  </a:txBody>
-                  <a:tcPr marL="30308" marR="30308" marT="0" marB="0"/>
-                </a:tc>
-                <a:tc>
-                  <a:txBody>
-                    <a:bodyPr/>
-                    <a:lstStyle/>
-                    <a:p>
-                      <a:pPr marL="0" marR="0" indent="0" algn="ctr">
-                        <a:lnSpc>
-                          <a:spcPct val="150000"/>
-                        </a:lnSpc>
-                        <a:spcBef>
-                          <a:spcPts val="0"/>
-                        </a:spcBef>
-                        <a:spcAft>
-                          <a:spcPts val="0"/>
-                        </a:spcAft>
-                      </a:pPr>
-                      <a:r>
-                        <a:rPr lang="ru-RU" sz="1300">
-                          <a:effectLst/>
-                        </a:rPr>
-                        <a:t>+</a:t>
-                      </a:r>
-                      <a:endParaRPr lang="en-US" sz="1300">
-                        <a:effectLst/>
-                        <a:latin typeface="Times New Roman"/>
-                        <a:ea typeface="Times New Roman"/>
-                      </a:endParaRPr>
-                    </a:p>
-                  </a:txBody>
-                  <a:tcPr marL="30308" marR="30308" marT="0" marB="0"/>
-                </a:tc>
-              </a:tr>
-              <a:tr h="283579">
-                <a:tc vMerge="1">
-                  <a:txBody>
-                    <a:bodyPr/>
-                    <a:lstStyle/>
-                    <a:p>
-                      <a:endParaRPr lang="en-US"/>
-                    </a:p>
-                  </a:txBody>
-                  <a:tcPr/>
-                </a:tc>
-                <a:tc>
-                  <a:txBody>
-                    <a:bodyPr/>
-                    <a:lstStyle/>
-                    <a:p>
-                      <a:pPr marL="0" marR="0" indent="0" algn="just">
-                        <a:lnSpc>
-                          <a:spcPct val="150000"/>
-                        </a:lnSpc>
-                        <a:spcBef>
-                          <a:spcPts val="0"/>
-                        </a:spcBef>
-                        <a:spcAft>
-                          <a:spcPts val="0"/>
-                        </a:spcAft>
-                      </a:pPr>
-                      <a:r>
-                        <a:rPr lang="ru-RU" sz="1300">
-                          <a:effectLst/>
-                        </a:rPr>
-                        <a:t>Метель</a:t>
-                      </a:r>
-                      <a:endParaRPr lang="en-US" sz="1300">
-                        <a:effectLst/>
-                        <a:latin typeface="Times New Roman"/>
-                        <a:ea typeface="Times New Roman"/>
-                      </a:endParaRPr>
-                    </a:p>
-                  </a:txBody>
-                  <a:tcPr marL="30308" marR="30308" marT="0" marB="0"/>
-                </a:tc>
-                <a:tc>
-                  <a:txBody>
-                    <a:bodyPr/>
-                    <a:lstStyle/>
-                    <a:p>
-                      <a:pPr marL="0" marR="0" indent="0" algn="ctr">
-                        <a:lnSpc>
-                          <a:spcPct val="150000"/>
-                        </a:lnSpc>
-                        <a:spcBef>
-                          <a:spcPts val="0"/>
-                        </a:spcBef>
-                        <a:spcAft>
-                          <a:spcPts val="0"/>
-                        </a:spcAft>
-                      </a:pPr>
-                      <a:r>
-                        <a:rPr lang="ru-RU" sz="1300">
-                          <a:effectLst/>
-                        </a:rPr>
-                        <a:t>-</a:t>
-                      </a:r>
-                      <a:endParaRPr lang="en-US" sz="1300">
-                        <a:effectLst/>
-                        <a:latin typeface="Times New Roman"/>
-                        <a:ea typeface="Times New Roman"/>
-                      </a:endParaRPr>
-                    </a:p>
-                  </a:txBody>
-                  <a:tcPr marL="30308" marR="30308" marT="0" marB="0"/>
-                </a:tc>
-              </a:tr>
-              <a:tr h="283579">
-                <a:tc vMerge="1">
-                  <a:txBody>
-                    <a:bodyPr/>
-                    <a:lstStyle/>
-                    <a:p>
-                      <a:endParaRPr lang="en-US"/>
-                    </a:p>
-                  </a:txBody>
-                  <a:tcPr/>
-                </a:tc>
-                <a:tc>
-                  <a:txBody>
-                    <a:bodyPr/>
-                    <a:lstStyle/>
-                    <a:p>
-                      <a:pPr marL="0" marR="0" indent="0" algn="just">
-                        <a:lnSpc>
-                          <a:spcPct val="150000"/>
-                        </a:lnSpc>
-                        <a:spcBef>
-                          <a:spcPts val="0"/>
-                        </a:spcBef>
-                        <a:spcAft>
-                          <a:spcPts val="0"/>
-                        </a:spcAft>
-                      </a:pPr>
-                      <a:r>
-                        <a:rPr lang="ru-RU" sz="1300">
-                          <a:effectLst/>
-                        </a:rPr>
-                        <a:t>Сильный ветер</a:t>
-                      </a:r>
-                      <a:endParaRPr lang="en-US" sz="1300">
-                        <a:effectLst/>
-                        <a:latin typeface="Times New Roman"/>
-                        <a:ea typeface="Times New Roman"/>
-                      </a:endParaRPr>
-                    </a:p>
-                  </a:txBody>
-                  <a:tcPr marL="30308" marR="30308" marT="0" marB="0"/>
-                </a:tc>
-                <a:tc>
-                  <a:txBody>
-                    <a:bodyPr/>
-                    <a:lstStyle/>
-                    <a:p>
-                      <a:pPr marL="0" marR="0" indent="0" algn="ctr">
-                        <a:lnSpc>
-                          <a:spcPct val="150000"/>
-                        </a:lnSpc>
-                        <a:spcBef>
-                          <a:spcPts val="0"/>
-                        </a:spcBef>
-                        <a:spcAft>
-                          <a:spcPts val="0"/>
-                        </a:spcAft>
-                      </a:pPr>
-                      <a:r>
-                        <a:rPr lang="ru-RU" sz="1300">
-                          <a:effectLst/>
-                        </a:rPr>
-                        <a:t>+</a:t>
-                      </a:r>
-                      <a:endParaRPr lang="en-US" sz="1300">
-                        <a:effectLst/>
-                        <a:latin typeface="Times New Roman"/>
-                        <a:ea typeface="Times New Roman"/>
-                      </a:endParaRPr>
-                    </a:p>
-                  </a:txBody>
-                  <a:tcPr marL="30308" marR="30308" marT="0" marB="0"/>
-                </a:tc>
-              </a:tr>
-              <a:tr h="283579">
-                <a:tc vMerge="1">
-                  <a:txBody>
-                    <a:bodyPr/>
-                    <a:lstStyle/>
-                    <a:p>
-                      <a:endParaRPr lang="en-US"/>
-                    </a:p>
-                  </a:txBody>
-                  <a:tcPr/>
-                </a:tc>
-                <a:tc>
-                  <a:txBody>
-                    <a:bodyPr/>
-                    <a:lstStyle/>
-                    <a:p>
-                      <a:pPr marL="0" marR="0" indent="0" algn="just">
-                        <a:lnSpc>
-                          <a:spcPct val="150000"/>
-                        </a:lnSpc>
-                        <a:spcBef>
-                          <a:spcPts val="0"/>
-                        </a:spcBef>
-                        <a:spcAft>
-                          <a:spcPts val="0"/>
-                        </a:spcAft>
-                      </a:pPr>
-                      <a:r>
-                        <a:rPr lang="ru-RU" sz="1300" dirty="0">
-                          <a:effectLst/>
-                        </a:rPr>
-                        <a:t>Качка</a:t>
-                      </a:r>
-                      <a:endParaRPr lang="en-US" sz="1300" dirty="0">
-                        <a:effectLst/>
-                        <a:latin typeface="Times New Roman"/>
-                        <a:ea typeface="Times New Roman"/>
-                      </a:endParaRPr>
-                    </a:p>
-                  </a:txBody>
-                  <a:tcPr marL="30308" marR="30308" marT="0" marB="0"/>
-                </a:tc>
-                <a:tc>
-                  <a:txBody>
-                    <a:bodyPr/>
-                    <a:lstStyle/>
-                    <a:p>
-                      <a:pPr marL="0" marR="0" indent="0" algn="ctr">
-                        <a:lnSpc>
-                          <a:spcPct val="150000"/>
-                        </a:lnSpc>
-                        <a:spcBef>
-                          <a:spcPts val="0"/>
-                        </a:spcBef>
-                        <a:spcAft>
-                          <a:spcPts val="0"/>
-                        </a:spcAft>
-                      </a:pPr>
-                      <a:r>
-                        <a:rPr lang="ru-RU" sz="1300">
-                          <a:effectLst/>
-                        </a:rPr>
-                        <a:t>+</a:t>
-                      </a:r>
-                      <a:endParaRPr lang="en-US" sz="1300">
-                        <a:effectLst/>
-                        <a:latin typeface="Times New Roman"/>
-                        <a:ea typeface="Times New Roman"/>
-                      </a:endParaRPr>
-                    </a:p>
-                  </a:txBody>
-                  <a:tcPr marL="30308" marR="30308" marT="0" marB="0"/>
-                </a:tc>
-              </a:tr>
-              <a:tr h="283579">
-                <a:tc rowSpan="4">
-                  <a:txBody>
-                    <a:bodyPr/>
-                    <a:lstStyle/>
-                    <a:p>
-                      <a:pPr marL="0" marR="0" indent="0" algn="just">
-                        <a:lnSpc>
-                          <a:spcPct val="150000"/>
-                        </a:lnSpc>
-                        <a:spcBef>
-                          <a:spcPts val="0"/>
-                        </a:spcBef>
-                        <a:spcAft>
-                          <a:spcPts val="0"/>
-                        </a:spcAft>
-                      </a:pPr>
-                      <a:r>
-                        <a:rPr lang="ru-RU" sz="1300">
-                          <a:effectLst/>
-                        </a:rPr>
-                        <a:t>Глобальная система навигации</a:t>
-                      </a:r>
-                      <a:endParaRPr lang="en-US" sz="1300">
-                        <a:effectLst/>
-                        <a:latin typeface="Times New Roman"/>
-                        <a:ea typeface="Times New Roman"/>
-                      </a:endParaRPr>
-                    </a:p>
-                  </a:txBody>
-                  <a:tcPr marL="30308" marR="30308" marT="0" marB="0"/>
-                </a:tc>
-                <a:tc>
-                  <a:txBody>
-                    <a:bodyPr/>
-                    <a:lstStyle/>
-                    <a:p>
-                      <a:pPr marL="0" marR="0" indent="0" algn="just">
-                        <a:lnSpc>
-                          <a:spcPct val="150000"/>
-                        </a:lnSpc>
-                        <a:spcBef>
-                          <a:spcPts val="0"/>
-                        </a:spcBef>
-                        <a:spcAft>
-                          <a:spcPts val="0"/>
-                        </a:spcAft>
-                      </a:pPr>
-                      <a:r>
-                        <a:rPr lang="ru-RU" sz="1300">
-                          <a:effectLst/>
-                        </a:rPr>
-                        <a:t>Полярная ночь</a:t>
-                      </a:r>
-                      <a:endParaRPr lang="en-US" sz="1300">
-                        <a:effectLst/>
-                        <a:latin typeface="Times New Roman"/>
-                        <a:ea typeface="Times New Roman"/>
-                      </a:endParaRPr>
-                    </a:p>
-                  </a:txBody>
-                  <a:tcPr marL="30308" marR="30308" marT="0" marB="0"/>
-                </a:tc>
-                <a:tc>
-                  <a:txBody>
-                    <a:bodyPr/>
-                    <a:lstStyle/>
-                    <a:p>
-                      <a:pPr marL="0" marR="0" indent="0" algn="ctr">
-                        <a:lnSpc>
-                          <a:spcPct val="150000"/>
-                        </a:lnSpc>
-                        <a:spcBef>
-                          <a:spcPts val="0"/>
-                        </a:spcBef>
-                        <a:spcAft>
-                          <a:spcPts val="0"/>
-                        </a:spcAft>
-                      </a:pPr>
-                      <a:r>
-                        <a:rPr lang="ru-RU" sz="1300">
-                          <a:effectLst/>
-                        </a:rPr>
-                        <a:t>+</a:t>
-                      </a:r>
-                      <a:endParaRPr lang="en-US" sz="1300">
-                        <a:effectLst/>
-                        <a:latin typeface="Times New Roman"/>
-                        <a:ea typeface="Times New Roman"/>
-                      </a:endParaRPr>
-                    </a:p>
-                  </a:txBody>
-                  <a:tcPr marL="30308" marR="30308" marT="0" marB="0"/>
-                </a:tc>
-              </a:tr>
-              <a:tr h="283579">
-                <a:tc vMerge="1">
-                  <a:txBody>
-                    <a:bodyPr/>
-                    <a:lstStyle/>
-                    <a:p>
-                      <a:endParaRPr lang="en-US"/>
-                    </a:p>
-                  </a:txBody>
-                  <a:tcPr/>
-                </a:tc>
-                <a:tc>
-                  <a:txBody>
-                    <a:bodyPr/>
-                    <a:lstStyle/>
-                    <a:p>
-                      <a:pPr marL="0" marR="0" indent="0" algn="just">
-                        <a:lnSpc>
-                          <a:spcPct val="150000"/>
-                        </a:lnSpc>
-                        <a:spcBef>
-                          <a:spcPts val="0"/>
-                        </a:spcBef>
-                        <a:spcAft>
-                          <a:spcPts val="0"/>
-                        </a:spcAft>
-                      </a:pPr>
-                      <a:r>
-                        <a:rPr lang="ru-RU" sz="1300">
-                          <a:effectLst/>
-                        </a:rPr>
-                        <a:t>Метель</a:t>
-                      </a:r>
-                      <a:endParaRPr lang="en-US" sz="1300">
-                        <a:effectLst/>
-                        <a:latin typeface="Times New Roman"/>
-                        <a:ea typeface="Times New Roman"/>
-                      </a:endParaRPr>
-                    </a:p>
-                  </a:txBody>
-                  <a:tcPr marL="30308" marR="30308" marT="0" marB="0"/>
-                </a:tc>
-                <a:tc>
-                  <a:txBody>
-                    <a:bodyPr/>
-                    <a:lstStyle/>
-                    <a:p>
-                      <a:pPr marL="0" marR="0" indent="0" algn="ctr">
-                        <a:lnSpc>
-                          <a:spcPct val="150000"/>
-                        </a:lnSpc>
-                        <a:spcBef>
-                          <a:spcPts val="0"/>
-                        </a:spcBef>
-                        <a:spcAft>
-                          <a:spcPts val="0"/>
-                        </a:spcAft>
-                      </a:pPr>
-                      <a:r>
-                        <a:rPr lang="ru-RU" sz="1300">
-                          <a:effectLst/>
-                        </a:rPr>
-                        <a:t>+</a:t>
-                      </a:r>
-                      <a:endParaRPr lang="en-US" sz="1300">
-                        <a:effectLst/>
-                        <a:latin typeface="Times New Roman"/>
-                        <a:ea typeface="Times New Roman"/>
-                      </a:endParaRPr>
-                    </a:p>
-                  </a:txBody>
-                  <a:tcPr marL="30308" marR="30308" marT="0" marB="0"/>
-                </a:tc>
-              </a:tr>
-              <a:tr h="283579">
-                <a:tc vMerge="1">
-                  <a:txBody>
-                    <a:bodyPr/>
-                    <a:lstStyle/>
-                    <a:p>
-                      <a:endParaRPr lang="en-US"/>
-                    </a:p>
-                  </a:txBody>
-                  <a:tcPr/>
-                </a:tc>
-                <a:tc>
-                  <a:txBody>
-                    <a:bodyPr/>
-                    <a:lstStyle/>
-                    <a:p>
-                      <a:pPr marL="0" marR="0" indent="0" algn="just">
-                        <a:lnSpc>
-                          <a:spcPct val="150000"/>
-                        </a:lnSpc>
-                        <a:spcBef>
-                          <a:spcPts val="0"/>
-                        </a:spcBef>
-                        <a:spcAft>
-                          <a:spcPts val="0"/>
-                        </a:spcAft>
-                      </a:pPr>
-                      <a:r>
-                        <a:rPr lang="ru-RU" sz="1300">
-                          <a:effectLst/>
-                        </a:rPr>
-                        <a:t>Сильный ветер</a:t>
-                      </a:r>
-                      <a:endParaRPr lang="en-US" sz="1300">
-                        <a:effectLst/>
-                        <a:latin typeface="Times New Roman"/>
-                        <a:ea typeface="Times New Roman"/>
-                      </a:endParaRPr>
-                    </a:p>
-                  </a:txBody>
-                  <a:tcPr marL="30308" marR="30308" marT="0" marB="0"/>
-                </a:tc>
-                <a:tc>
-                  <a:txBody>
-                    <a:bodyPr/>
-                    <a:lstStyle/>
-                    <a:p>
-                      <a:pPr marL="0" marR="0" indent="0" algn="ctr">
-                        <a:lnSpc>
-                          <a:spcPct val="150000"/>
-                        </a:lnSpc>
-                        <a:spcBef>
-                          <a:spcPts val="0"/>
-                        </a:spcBef>
-                        <a:spcAft>
-                          <a:spcPts val="0"/>
-                        </a:spcAft>
-                      </a:pPr>
-                      <a:r>
-                        <a:rPr lang="ru-RU" sz="1300">
-                          <a:effectLst/>
-                        </a:rPr>
-                        <a:t>+</a:t>
-                      </a:r>
-                      <a:endParaRPr lang="en-US" sz="1300">
-                        <a:effectLst/>
-                        <a:latin typeface="Times New Roman"/>
-                        <a:ea typeface="Times New Roman"/>
-                      </a:endParaRPr>
-                    </a:p>
-                  </a:txBody>
-                  <a:tcPr marL="30308" marR="30308" marT="0" marB="0"/>
-                </a:tc>
-              </a:tr>
-              <a:tr h="283579">
-                <a:tc vMerge="1">
-                  <a:txBody>
-                    <a:bodyPr/>
-                    <a:lstStyle/>
-                    <a:p>
-                      <a:endParaRPr lang="en-US"/>
-                    </a:p>
-                  </a:txBody>
-                  <a:tcPr/>
-                </a:tc>
-                <a:tc>
-                  <a:txBody>
-                    <a:bodyPr/>
-                    <a:lstStyle/>
-                    <a:p>
-                      <a:pPr marL="0" marR="0" indent="0" algn="just">
-                        <a:lnSpc>
-                          <a:spcPct val="150000"/>
-                        </a:lnSpc>
-                        <a:spcBef>
-                          <a:spcPts val="0"/>
-                        </a:spcBef>
-                        <a:spcAft>
-                          <a:spcPts val="0"/>
-                        </a:spcAft>
-                      </a:pPr>
-                      <a:r>
-                        <a:rPr lang="ru-RU" sz="1300">
-                          <a:effectLst/>
-                        </a:rPr>
-                        <a:t>Качка</a:t>
-                      </a:r>
-                      <a:endParaRPr lang="en-US" sz="1300">
-                        <a:effectLst/>
-                        <a:latin typeface="Times New Roman"/>
-                        <a:ea typeface="Times New Roman"/>
-                      </a:endParaRPr>
-                    </a:p>
-                  </a:txBody>
-                  <a:tcPr marL="30308" marR="30308" marT="0" marB="0"/>
-                </a:tc>
-                <a:tc>
-                  <a:txBody>
-                    <a:bodyPr/>
-                    <a:lstStyle/>
-                    <a:p>
-                      <a:pPr marL="0" marR="0" indent="0" algn="ctr">
-                        <a:lnSpc>
-                          <a:spcPct val="150000"/>
-                        </a:lnSpc>
-                        <a:spcBef>
-                          <a:spcPts val="0"/>
-                        </a:spcBef>
-                        <a:spcAft>
-                          <a:spcPts val="0"/>
-                        </a:spcAft>
-                      </a:pPr>
-                      <a:r>
-                        <a:rPr lang="ru-RU" sz="1300">
-                          <a:effectLst/>
-                        </a:rPr>
-                        <a:t>+</a:t>
-                      </a:r>
-                      <a:endParaRPr lang="en-US" sz="1300">
-                        <a:effectLst/>
-                        <a:latin typeface="Times New Roman"/>
-                        <a:ea typeface="Times New Roman"/>
-                      </a:endParaRPr>
-                    </a:p>
-                  </a:txBody>
-                  <a:tcPr marL="30308" marR="30308" marT="0" marB="0"/>
-                </a:tc>
-              </a:tr>
-              <a:tr h="283579">
-                <a:tc rowSpan="4">
-                  <a:txBody>
-                    <a:bodyPr/>
-                    <a:lstStyle/>
-                    <a:p>
-                      <a:pPr marL="0" marR="0" indent="0" algn="just">
-                        <a:lnSpc>
-                          <a:spcPct val="150000"/>
-                        </a:lnSpc>
-                        <a:spcBef>
-                          <a:spcPts val="0"/>
-                        </a:spcBef>
-                        <a:spcAft>
-                          <a:spcPts val="0"/>
-                        </a:spcAft>
-                      </a:pPr>
-                      <a:r>
-                        <a:rPr lang="ru-RU" sz="1300">
-                          <a:effectLst/>
-                        </a:rPr>
-                        <a:t>Инерциальная навигационная система</a:t>
-                      </a:r>
-                      <a:endParaRPr lang="en-US" sz="1300">
-                        <a:effectLst/>
-                        <a:latin typeface="Times New Roman"/>
-                        <a:ea typeface="Times New Roman"/>
-                      </a:endParaRPr>
-                    </a:p>
-                  </a:txBody>
-                  <a:tcPr marL="30308" marR="30308" marT="0" marB="0"/>
-                </a:tc>
-                <a:tc>
-                  <a:txBody>
-                    <a:bodyPr/>
-                    <a:lstStyle/>
-                    <a:p>
-                      <a:pPr marL="0" marR="0" indent="0" algn="just">
-                        <a:lnSpc>
-                          <a:spcPct val="150000"/>
-                        </a:lnSpc>
-                        <a:spcBef>
-                          <a:spcPts val="0"/>
-                        </a:spcBef>
-                        <a:spcAft>
-                          <a:spcPts val="0"/>
-                        </a:spcAft>
-                      </a:pPr>
-                      <a:r>
-                        <a:rPr lang="ru-RU" sz="1300">
-                          <a:effectLst/>
-                        </a:rPr>
-                        <a:t>Полярная ночь</a:t>
-                      </a:r>
-                      <a:endParaRPr lang="en-US" sz="1300">
-                        <a:effectLst/>
-                        <a:latin typeface="Times New Roman"/>
-                        <a:ea typeface="Times New Roman"/>
-                      </a:endParaRPr>
-                    </a:p>
-                  </a:txBody>
-                  <a:tcPr marL="30308" marR="30308" marT="0" marB="0"/>
-                </a:tc>
-                <a:tc>
-                  <a:txBody>
-                    <a:bodyPr/>
-                    <a:lstStyle/>
-                    <a:p>
-                      <a:pPr marL="0" marR="0" indent="0" algn="ctr">
-                        <a:lnSpc>
-                          <a:spcPct val="150000"/>
-                        </a:lnSpc>
-                        <a:spcBef>
-                          <a:spcPts val="0"/>
-                        </a:spcBef>
-                        <a:spcAft>
-                          <a:spcPts val="0"/>
-                        </a:spcAft>
-                      </a:pPr>
-                      <a:r>
-                        <a:rPr lang="ru-RU" sz="1300">
-                          <a:effectLst/>
-                        </a:rPr>
-                        <a:t>+</a:t>
-                      </a:r>
-                      <a:endParaRPr lang="en-US" sz="1300">
-                        <a:effectLst/>
-                        <a:latin typeface="Times New Roman"/>
-                        <a:ea typeface="Times New Roman"/>
-                      </a:endParaRPr>
-                    </a:p>
-                  </a:txBody>
-                  <a:tcPr marL="30308" marR="30308" marT="0" marB="0"/>
-                </a:tc>
-              </a:tr>
-              <a:tr h="283579">
-                <a:tc vMerge="1">
-                  <a:txBody>
-                    <a:bodyPr/>
-                    <a:lstStyle/>
-                    <a:p>
-                      <a:endParaRPr lang="en-US"/>
-                    </a:p>
-                  </a:txBody>
-                  <a:tcPr/>
-                </a:tc>
-                <a:tc>
-                  <a:txBody>
-                    <a:bodyPr/>
-                    <a:lstStyle/>
-                    <a:p>
-                      <a:pPr marL="0" marR="0" indent="0" algn="just">
-                        <a:lnSpc>
-                          <a:spcPct val="150000"/>
-                        </a:lnSpc>
-                        <a:spcBef>
-                          <a:spcPts val="0"/>
-                        </a:spcBef>
-                        <a:spcAft>
-                          <a:spcPts val="0"/>
-                        </a:spcAft>
-                      </a:pPr>
-                      <a:r>
-                        <a:rPr lang="ru-RU" sz="1300">
-                          <a:effectLst/>
-                        </a:rPr>
-                        <a:t>Метель</a:t>
-                      </a:r>
-                      <a:endParaRPr lang="en-US" sz="1300">
-                        <a:effectLst/>
-                        <a:latin typeface="Times New Roman"/>
-                        <a:ea typeface="Times New Roman"/>
-                      </a:endParaRPr>
-                    </a:p>
-                  </a:txBody>
-                  <a:tcPr marL="30308" marR="30308" marT="0" marB="0"/>
-                </a:tc>
-                <a:tc>
-                  <a:txBody>
-                    <a:bodyPr/>
-                    <a:lstStyle/>
-                    <a:p>
-                      <a:pPr marL="0" marR="0" indent="0" algn="ctr">
-                        <a:lnSpc>
-                          <a:spcPct val="150000"/>
-                        </a:lnSpc>
-                        <a:spcBef>
-                          <a:spcPts val="0"/>
-                        </a:spcBef>
-                        <a:spcAft>
-                          <a:spcPts val="0"/>
-                        </a:spcAft>
-                      </a:pPr>
-                      <a:r>
-                        <a:rPr lang="ru-RU" sz="1300">
-                          <a:effectLst/>
-                        </a:rPr>
-                        <a:t>+</a:t>
-                      </a:r>
-                      <a:endParaRPr lang="en-US" sz="1300">
-                        <a:effectLst/>
-                        <a:latin typeface="Times New Roman"/>
-                        <a:ea typeface="Times New Roman"/>
-                      </a:endParaRPr>
-                    </a:p>
-                  </a:txBody>
-                  <a:tcPr marL="30308" marR="30308" marT="0" marB="0"/>
-                </a:tc>
-              </a:tr>
-              <a:tr h="283579">
-                <a:tc vMerge="1">
-                  <a:txBody>
-                    <a:bodyPr/>
-                    <a:lstStyle/>
-                    <a:p>
-                      <a:endParaRPr lang="en-US"/>
-                    </a:p>
-                  </a:txBody>
-                  <a:tcPr/>
-                </a:tc>
-                <a:tc>
-                  <a:txBody>
-                    <a:bodyPr/>
-                    <a:lstStyle/>
-                    <a:p>
-                      <a:pPr marL="0" marR="0" indent="0" algn="just">
-                        <a:lnSpc>
-                          <a:spcPct val="150000"/>
-                        </a:lnSpc>
-                        <a:spcBef>
-                          <a:spcPts val="0"/>
-                        </a:spcBef>
-                        <a:spcAft>
-                          <a:spcPts val="0"/>
-                        </a:spcAft>
-                      </a:pPr>
-                      <a:r>
-                        <a:rPr lang="ru-RU" sz="1300">
-                          <a:effectLst/>
-                        </a:rPr>
-                        <a:t>Сильный ветер</a:t>
-                      </a:r>
-                      <a:endParaRPr lang="en-US" sz="1300">
-                        <a:effectLst/>
-                        <a:latin typeface="Times New Roman"/>
-                        <a:ea typeface="Times New Roman"/>
-                      </a:endParaRPr>
-                    </a:p>
-                  </a:txBody>
-                  <a:tcPr marL="30308" marR="30308" marT="0" marB="0"/>
-                </a:tc>
-                <a:tc>
-                  <a:txBody>
-                    <a:bodyPr/>
-                    <a:lstStyle/>
-                    <a:p>
-                      <a:pPr marL="0" marR="0" indent="0" algn="ctr">
-                        <a:lnSpc>
-                          <a:spcPct val="150000"/>
-                        </a:lnSpc>
-                        <a:spcBef>
-                          <a:spcPts val="0"/>
-                        </a:spcBef>
-                        <a:spcAft>
-                          <a:spcPts val="0"/>
-                        </a:spcAft>
-                      </a:pPr>
-                      <a:r>
-                        <a:rPr lang="ru-RU" sz="1300">
-                          <a:effectLst/>
-                        </a:rPr>
-                        <a:t>+</a:t>
-                      </a:r>
-                      <a:endParaRPr lang="en-US" sz="1300">
-                        <a:effectLst/>
-                        <a:latin typeface="Times New Roman"/>
-                        <a:ea typeface="Times New Roman"/>
-                      </a:endParaRPr>
-                    </a:p>
-                  </a:txBody>
-                  <a:tcPr marL="30308" marR="30308" marT="0" marB="0"/>
-                </a:tc>
-              </a:tr>
-              <a:tr h="283579">
-                <a:tc vMerge="1">
-                  <a:txBody>
-                    <a:bodyPr/>
-                    <a:lstStyle/>
-                    <a:p>
-                      <a:endParaRPr lang="en-US"/>
-                    </a:p>
-                  </a:txBody>
-                  <a:tcPr/>
-                </a:tc>
-                <a:tc>
-                  <a:txBody>
-                    <a:bodyPr/>
-                    <a:lstStyle/>
-                    <a:p>
-                      <a:pPr marL="0" marR="0" indent="0" algn="just">
-                        <a:lnSpc>
-                          <a:spcPct val="150000"/>
-                        </a:lnSpc>
-                        <a:spcBef>
-                          <a:spcPts val="0"/>
-                        </a:spcBef>
-                        <a:spcAft>
-                          <a:spcPts val="0"/>
-                        </a:spcAft>
-                      </a:pPr>
-                      <a:r>
-                        <a:rPr lang="ru-RU" sz="1300">
-                          <a:effectLst/>
-                        </a:rPr>
-                        <a:t>Качка</a:t>
-                      </a:r>
-                      <a:endParaRPr lang="en-US" sz="1300">
-                        <a:effectLst/>
-                        <a:latin typeface="Times New Roman"/>
-                        <a:ea typeface="Times New Roman"/>
-                      </a:endParaRPr>
-                    </a:p>
-                  </a:txBody>
-                  <a:tcPr marL="30308" marR="30308" marT="0" marB="0"/>
-                </a:tc>
-                <a:tc>
-                  <a:txBody>
-                    <a:bodyPr/>
-                    <a:lstStyle/>
-                    <a:p>
-                      <a:pPr marL="0" marR="0" indent="0" algn="ctr">
-                        <a:lnSpc>
-                          <a:spcPct val="150000"/>
-                        </a:lnSpc>
-                        <a:spcBef>
-                          <a:spcPts val="0"/>
-                        </a:spcBef>
-                        <a:spcAft>
-                          <a:spcPts val="0"/>
-                        </a:spcAft>
-                      </a:pPr>
-                      <a:r>
-                        <a:rPr lang="ru-RU" sz="1300" dirty="0">
-                          <a:effectLst/>
-                        </a:rPr>
-                        <a:t>-</a:t>
-                      </a:r>
-                      <a:endParaRPr lang="en-US" sz="1300" dirty="0">
-                        <a:effectLst/>
-                        <a:latin typeface="Times New Roman"/>
-                        <a:ea typeface="Times New Roman"/>
-                      </a:endParaRPr>
-                    </a:p>
-                  </a:txBody>
-                  <a:tcPr marL="30308" marR="30308" marT="0" marB="0"/>
-                </a:tc>
-              </a:tr>
-            </a:tbl>
-          </a:graphicData>
-        </a:graphic>
-      </p:graphicFrame>
       <p:sp>
         <p:nvSpPr>
-          <p:cNvPr id="11" name="TextBox 10"/>
+          <p:cNvPr id="3" name="TextBox 2"/>
           <p:cNvSpPr txBox="1"/>
           <p:nvPr/>
         </p:nvSpPr>
         <p:spPr>
           <a:xfrm>
-            <a:off x="5797550" y="1014499"/>
-            <a:ext cx="3276600" cy="1877437"/>
+            <a:off x="266700" y="927100"/>
+            <a:ext cx="8623300" cy="3970318"/>
           </a:xfrm>
           <a:prstGeom prst="rect">
             <a:avLst/>
@@ -6440,73 +6373,128 @@
           </a:bodyPr>
           <a:lstStyle/>
           <a:p>
-            <a:pPr marL="800100" lvl="1" indent="-342900">
-              <a:buFont typeface="Arial" panose="020B0604020202020204" pitchFamily="34" charset="0"/>
-              <a:buChar char="•"/>
+            <a:pPr marL="285750" indent="-285750" algn="just">
+              <a:buFontTx/>
+              <a:buChar char="-"/>
             </a:pPr>
             <a:r>
-              <a:rPr lang="ru-RU" sz="1600" dirty="0"/>
-              <a:t>сильный ветер </a:t>
-            </a:r>
-          </a:p>
-          <a:p>
-            <a:pPr marL="800100" lvl="1" indent="-342900">
-              <a:buFont typeface="Arial" panose="020B0604020202020204" pitchFamily="34" charset="0"/>
-              <a:buChar char="•"/>
+              <a:rPr lang="ru-RU" sz="1800" dirty="0" smtClean="0"/>
+              <a:t>больший </a:t>
+            </a:r>
+            <a:r>
+              <a:rPr lang="ru-RU" sz="1800" dirty="0"/>
+              <a:t>радиус действия, достигаемый за счет рассредоточения роботов по всей рабочей </a:t>
+            </a:r>
+            <a:r>
+              <a:rPr lang="ru-RU" sz="1800" dirty="0" smtClean="0"/>
+              <a:t>зоне;</a:t>
+            </a:r>
+          </a:p>
+          <a:p>
+            <a:pPr marL="285750" indent="-285750" algn="just">
+              <a:buFontTx/>
+              <a:buChar char="-"/>
             </a:pPr>
-            <a:r>
-              <a:rPr lang="ru-RU" sz="1600" dirty="0"/>
-              <a:t>низкие </a:t>
-            </a:r>
-            <a:r>
-              <a:rPr lang="ru-RU" sz="1600" dirty="0" smtClean="0"/>
-              <a:t>температуры</a:t>
-            </a:r>
-          </a:p>
-          <a:p>
-            <a:pPr marL="800100" lvl="1" indent="-342900">
-              <a:buFont typeface="Arial" panose="020B0604020202020204" pitchFamily="34" charset="0"/>
-              <a:buChar char="•"/>
+            <a:endParaRPr lang="ru-RU" sz="1800" dirty="0" smtClean="0"/>
+          </a:p>
+          <a:p>
+            <a:pPr marL="285750" indent="-285750" algn="just">
+              <a:buFontTx/>
+              <a:buChar char="-"/>
             </a:pPr>
             <a:r>
-              <a:rPr lang="ru-RU" sz="1600" dirty="0"/>
-              <a:t>метели </a:t>
-            </a:r>
-          </a:p>
-          <a:p>
-            <a:pPr marL="800100" lvl="1" indent="-342900">
-              <a:buFont typeface="Arial" panose="020B0604020202020204" pitchFamily="34" charset="0"/>
-              <a:buChar char="•"/>
+              <a:rPr lang="ru-RU" sz="1800" dirty="0"/>
+              <a:t>более высокая вероятность выполнения задания, достигаемая за счет возможности перераспределения целей между </a:t>
+            </a:r>
+            <a:r>
+              <a:rPr lang="ru-RU" sz="1800" dirty="0" smtClean="0"/>
+              <a:t>роботами</a:t>
+            </a:r>
+            <a:r>
+              <a:rPr lang="ru-RU" sz="1800" dirty="0" smtClean="0"/>
+              <a:t>;</a:t>
+            </a:r>
+            <a:endParaRPr lang="ru-RU" sz="1800" dirty="0" smtClean="0"/>
+          </a:p>
+          <a:p>
+            <a:pPr marL="285750" indent="-285750" algn="just">
+              <a:buFontTx/>
+              <a:buChar char="-"/>
             </a:pPr>
-            <a:r>
-              <a:rPr lang="ru-RU" sz="1600" dirty="0"/>
-              <a:t>ледяные и снежные торосы</a:t>
-            </a:r>
-          </a:p>
-          <a:p>
-            <a:pPr marL="800100" lvl="1" indent="-342900">
-              <a:buFont typeface="Arial" panose="020B0604020202020204" pitchFamily="34" charset="0"/>
-              <a:buChar char="•"/>
+            <a:endParaRPr lang="ru-RU" sz="1800" dirty="0" smtClean="0"/>
+          </a:p>
+          <a:p>
+            <a:pPr marL="285750" indent="-285750" algn="just">
+              <a:buFontTx/>
+              <a:buChar char="-"/>
             </a:pPr>
             <a:r>
-              <a:rPr lang="ru-RU" sz="1600" dirty="0"/>
-              <a:t>полярная </a:t>
-            </a:r>
-            <a:r>
-              <a:rPr lang="ru-RU" sz="1600" dirty="0" smtClean="0"/>
-              <a:t>ночь</a:t>
-            </a:r>
-            <a:endParaRPr lang="ru-RU" sz="1600" dirty="0"/>
-          </a:p>
-          <a:p>
-            <a:endParaRPr lang="en-US" dirty="0"/>
+              <a:rPr lang="ru-RU" sz="1800" dirty="0"/>
+              <a:t>б</a:t>
+            </a:r>
+            <a:r>
+              <a:rPr lang="ru-RU" sz="1800" dirty="0" smtClean="0"/>
+              <a:t>олее высокая скорость выполнения задания за счет выделения подцелей и распределения их между роботами</a:t>
+            </a:r>
+            <a:r>
+              <a:rPr lang="ru-RU" sz="1800" dirty="0" smtClean="0"/>
+              <a:t>;</a:t>
+            </a:r>
+            <a:endParaRPr lang="ru-RU" sz="1800" dirty="0" smtClean="0"/>
+          </a:p>
+          <a:p>
+            <a:pPr marL="285750" indent="-285750" algn="just">
+              <a:buFontTx/>
+              <a:buChar char="-"/>
+            </a:pPr>
+            <a:endParaRPr lang="ru-RU" sz="1800" dirty="0" smtClean="0"/>
+          </a:p>
+          <a:p>
+            <a:pPr marL="285750" indent="-285750" algn="just">
+              <a:buFontTx/>
+              <a:buChar char="-"/>
+            </a:pPr>
+            <a:r>
+              <a:rPr lang="ru-RU" sz="1800" dirty="0" smtClean="0"/>
+              <a:t>устойчивость к динамически меняющимся условиям окружающей среды, за счет избыточности;</a:t>
+            </a:r>
+            <a:endParaRPr lang="ru-RU" sz="1800" dirty="0" smtClean="0"/>
+          </a:p>
+          <a:p>
+            <a:pPr marL="285750" indent="-285750" algn="just">
+              <a:buFontTx/>
+              <a:buChar char="-"/>
+            </a:pPr>
+            <a:endParaRPr lang="ru-RU" sz="1800" dirty="0" smtClean="0"/>
+          </a:p>
+          <a:p>
+            <a:pPr marL="285750" indent="-285750" algn="just">
+              <a:buFontTx/>
+              <a:buChar char="-"/>
+            </a:pPr>
+            <a:r>
+              <a:rPr lang="ru-RU" sz="1800" dirty="0" smtClean="0"/>
+              <a:t>гораздо более широкий спектр выполняемых задач</a:t>
+            </a:r>
+            <a:r>
+              <a:rPr lang="ru-RU" sz="1800" dirty="0"/>
+              <a:t>;</a:t>
+            </a:r>
+            <a:endParaRPr lang="ru-RU" sz="1800" dirty="0" smtClean="0"/>
+          </a:p>
+          <a:p>
+            <a:pPr marL="285750" indent="-285750" algn="just">
+              <a:buFontTx/>
+              <a:buChar char="-"/>
+            </a:pPr>
+            <a:endParaRPr lang="ru-RU" sz="1800" dirty="0" smtClean="0"/>
           </a:p>
         </p:txBody>
       </p:sp>
     </p:spTree>
     <p:extLst>
       <p:ext uri="{BB962C8B-B14F-4D97-AF65-F5344CB8AC3E}">
-        <p14:creationId xmlns:p14="http://schemas.microsoft.com/office/powerpoint/2010/main" val="2536239404"/>
+        <p14:creationId xmlns:p14="http://schemas.microsoft.com/office/powerpoint/2010/main" val="1430426045"/>
       </p:ext>
     </p:extLst>
   </p:cSld>
@@ -6563,11 +6551,12 @@
           <a:bodyPr/>
           <a:lstStyle/>
           <a:p>
-            <a:pPr algn="ctr"/>
+            <a:pPr lvl="0" algn="ctr"/>
             <a:r>
               <a:rPr lang="ru-RU" dirty="0" smtClean="0"/>
-              <a:t>Актуальность темы диссертации</a:t>
-            </a:r>
+              <a:t>Группы операций</a:t>
+            </a:r>
+            <a:endParaRPr lang="ru-RU" dirty="0"/>
           </a:p>
         </p:txBody>
       </p:sp>
@@ -6580,7 +6569,7 @@
         <p:spPr>
           <a:xfrm>
             <a:off x="558800" y="1498600"/>
-            <a:ext cx="7924800" cy="2554545"/>
+            <a:ext cx="7924800" cy="4093428"/>
           </a:xfrm>
           <a:prstGeom prst="rect">
             <a:avLst/>
@@ -6593,51 +6582,122 @@
           </a:bodyPr>
           <a:lstStyle/>
           <a:p>
+            <a:pPr marL="342900" lvl="0" indent="-342900">
+              <a:buFont typeface="Arial" pitchFamily="34" charset="0"/>
+              <a:buChar char="•"/>
+            </a:pPr>
+            <a:r>
+              <a:rPr lang="ru-RU" dirty="0"/>
+              <a:t>мониторинг; </a:t>
+            </a:r>
+            <a:endParaRPr lang="ru-RU" dirty="0" smtClean="0"/>
+          </a:p>
+          <a:p>
+            <a:pPr marL="342900" lvl="0" indent="-342900">
+              <a:buFont typeface="Arial" pitchFamily="34" charset="0"/>
+              <a:buChar char="•"/>
+            </a:pPr>
+            <a:endParaRPr lang="ru-RU" dirty="0"/>
+          </a:p>
+          <a:p>
+            <a:pPr marL="342900" lvl="0" indent="-342900">
+              <a:buFont typeface="Arial" pitchFamily="34" charset="0"/>
+              <a:buChar char="•"/>
+            </a:pPr>
+            <a:r>
+              <a:rPr lang="ru-RU" dirty="0"/>
+              <a:t>приведения группировки в боевую готовность</a:t>
+            </a:r>
+            <a:r>
+              <a:rPr lang="ru-RU" dirty="0" smtClean="0"/>
+              <a:t>;</a:t>
+            </a:r>
+          </a:p>
+          <a:p>
+            <a:pPr marL="342900" lvl="0" indent="-342900">
+              <a:buFont typeface="Arial" pitchFamily="34" charset="0"/>
+              <a:buChar char="•"/>
+            </a:pPr>
+            <a:endParaRPr lang="ru-RU" dirty="0"/>
+          </a:p>
+          <a:p>
+            <a:pPr marL="342900" lvl="0" indent="-342900">
+              <a:buFont typeface="Arial" pitchFamily="34" charset="0"/>
+              <a:buChar char="•"/>
+            </a:pPr>
+            <a:r>
+              <a:rPr lang="ru-RU" dirty="0"/>
+              <a:t>оптимально распределение роботов на объекте</a:t>
+            </a:r>
+            <a:r>
+              <a:rPr lang="ru-RU" dirty="0" smtClean="0"/>
+              <a:t>;</a:t>
+            </a:r>
+          </a:p>
+          <a:p>
+            <a:pPr marL="342900" lvl="0" indent="-342900">
+              <a:buFont typeface="Arial" pitchFamily="34" charset="0"/>
+              <a:buChar char="•"/>
+            </a:pPr>
+            <a:endParaRPr lang="ru-RU" dirty="0"/>
+          </a:p>
+          <a:p>
+            <a:pPr marL="342900" lvl="0" indent="-342900">
+              <a:buFont typeface="Arial" pitchFamily="34" charset="0"/>
+              <a:buChar char="•"/>
+            </a:pPr>
+            <a:r>
+              <a:rPr lang="ru-RU" dirty="0"/>
+              <a:t>определение мест, где находятся спасаемые люди</a:t>
+            </a:r>
+            <a:r>
+              <a:rPr lang="ru-RU" dirty="0" smtClean="0"/>
+              <a:t>;</a:t>
+            </a:r>
+          </a:p>
+          <a:p>
+            <a:pPr marL="342900" lvl="0" indent="-342900">
+              <a:buFont typeface="Arial" pitchFamily="34" charset="0"/>
+              <a:buChar char="•"/>
+            </a:pPr>
+            <a:endParaRPr lang="ru-RU" dirty="0"/>
+          </a:p>
+          <a:p>
+            <a:pPr marL="342900" lvl="0" indent="-342900">
+              <a:buFont typeface="Arial" pitchFamily="34" charset="0"/>
+              <a:buChar char="•"/>
+            </a:pPr>
+            <a:r>
+              <a:rPr lang="ru-RU" smtClean="0"/>
+              <a:t>спасение</a:t>
+            </a:r>
+            <a:r>
+              <a:rPr lang="ru-RU" dirty="0" smtClean="0"/>
+              <a:t>;</a:t>
+            </a:r>
+          </a:p>
+          <a:p>
+            <a:pPr marL="342900" lvl="0" indent="-342900">
+              <a:buFont typeface="Arial" pitchFamily="34" charset="0"/>
+              <a:buChar char="•"/>
+            </a:pPr>
+            <a:endParaRPr lang="ru-RU" dirty="0"/>
+          </a:p>
+          <a:p>
+            <a:pPr marL="342900" lvl="0" indent="-342900">
+              <a:buFont typeface="Arial" pitchFamily="34" charset="0"/>
+              <a:buChar char="•"/>
+            </a:pPr>
+            <a:r>
+              <a:rPr lang="ru-RU" dirty="0"/>
+              <a:t>быстрый уход роботов (со спасаемыми людьми) на безопасное расстояние.</a:t>
+            </a:r>
+          </a:p>
+          <a:p>
             <a:pPr marL="342900" indent="-342900">
               <a:buFont typeface="Arial" panose="020B0604020202020204" pitchFamily="34" charset="0"/>
               <a:buChar char="•"/>
             </a:pPr>
-            <a:r>
-              <a:rPr lang="ru-RU" dirty="0"/>
-              <a:t>Данная задача имеет практическую ценность, ее решение позволит производить управление наземными роботами в сложных климатических условиях полярного круга</a:t>
-            </a:r>
-            <a:r>
-              <a:rPr lang="ru-RU" dirty="0" smtClean="0"/>
-              <a:t>.</a:t>
-            </a:r>
-          </a:p>
-          <a:p>
-            <a:pPr marL="342900" indent="-342900">
-              <a:buFont typeface="Arial" panose="020B0604020202020204" pitchFamily="34" charset="0"/>
-              <a:buChar char="•"/>
-            </a:pPr>
-            <a:endParaRPr lang="ru-RU" dirty="0"/>
-          </a:p>
-          <a:p>
-            <a:pPr marL="342900" indent="-342900">
-              <a:buFont typeface="Arial" panose="020B0604020202020204" pitchFamily="34" charset="0"/>
-              <a:buChar char="•"/>
-            </a:pPr>
-            <a:r>
-              <a:rPr lang="ru-RU" dirty="0"/>
-              <a:t>Решение задачи необходимо для создания робототехнических систем автоматического  спасения людей на </a:t>
-            </a:r>
-            <a:r>
-              <a:rPr lang="ru-RU" dirty="0" smtClean="0"/>
-              <a:t>нефтяной платформе (в разработке </a:t>
-            </a:r>
-            <a:r>
-              <a:rPr lang="ru-RU" dirty="0"/>
-              <a:t>данной системы </a:t>
-            </a:r>
-            <a:r>
-              <a:rPr lang="ru-RU" dirty="0" smtClean="0"/>
-              <a:t>принимает участие </a:t>
-            </a:r>
-            <a:r>
-              <a:rPr lang="ru-RU" dirty="0"/>
-              <a:t>ЦНИИ РТК).</a:t>
-            </a:r>
             <a:endParaRPr lang="en-US" dirty="0"/>
           </a:p>
         </p:txBody>

</xml_diff>